<commit_message>
Added reset button and score
</commit_message>
<xml_diff>
--- a/L6 Group-1 Pitch 1.pptx
+++ b/L6 Group-1 Pitch 1.pptx
@@ -11,18 +11,20 @@
     <p:sldId id="259" r:id="rId5"/>
     <p:sldId id="260" r:id="rId6"/>
     <p:sldId id="272" r:id="rId7"/>
-    <p:sldId id="261" r:id="rId8"/>
-    <p:sldId id="262" r:id="rId9"/>
-    <p:sldId id="263" r:id="rId10"/>
-    <p:sldId id="264" r:id="rId11"/>
-    <p:sldId id="265" r:id="rId12"/>
-    <p:sldId id="266" r:id="rId13"/>
-    <p:sldId id="267" r:id="rId14"/>
-    <p:sldId id="268" r:id="rId15"/>
-    <p:sldId id="269" r:id="rId16"/>
-    <p:sldId id="270" r:id="rId17"/>
-    <p:sldId id="273" r:id="rId18"/>
-    <p:sldId id="271" r:id="rId19"/>
+    <p:sldId id="274" r:id="rId8"/>
+    <p:sldId id="261" r:id="rId9"/>
+    <p:sldId id="262" r:id="rId10"/>
+    <p:sldId id="263" r:id="rId11"/>
+    <p:sldId id="264" r:id="rId12"/>
+    <p:sldId id="265" r:id="rId13"/>
+    <p:sldId id="275" r:id="rId14"/>
+    <p:sldId id="266" r:id="rId15"/>
+    <p:sldId id="267" r:id="rId16"/>
+    <p:sldId id="268" r:id="rId17"/>
+    <p:sldId id="269" r:id="rId18"/>
+    <p:sldId id="270" r:id="rId19"/>
+    <p:sldId id="273" r:id="rId20"/>
+    <p:sldId id="271" r:id="rId21"/>
   </p:sldIdLst>
   <p:sldSz cx="9144000" cy="6858000" type="screen4x3"/>
   <p:notesSz cx="6858000" cy="9144000"/>
@@ -123,7 +125,7 @@
   </p:defaultTextStyle>
   <p:extLst>
     <p:ext uri="{EFAFB233-063F-42B5-8137-9DF3F51BA10A}">
-      <p15:sldGuideLst xmlns:p15="http://schemas.microsoft.com/office/powerpoint/2012/main">
+      <p15:sldGuideLst xmlns:p15="http://schemas.microsoft.com/office/powerpoint/2012/main" xmlns="">
         <p15:guide id="1" orient="horz" pos="2160">
           <p15:clr>
             <a:srgbClr val="A4A3A4"/>
@@ -3710,1726 +3712,6 @@
           <a:p>
             <a:r>
               <a:rPr lang="en-GB" dirty="0" smtClean="0"/>
-              <a:t>Idea 2 - Challenges </a:t>
-            </a:r>
-            <a:endParaRPr lang="en-GB" dirty="0"/>
-          </a:p>
-        </p:txBody>
-      </p:sp>
-      <p:sp>
-        <p:nvSpPr>
-          <p:cNvPr id="3" name="Content Placeholder 2"/>
-          <p:cNvSpPr>
-            <a:spLocks noGrp="1"/>
-          </p:cNvSpPr>
-          <p:nvPr>
-            <p:ph idx="1"/>
-          </p:nvPr>
-        </p:nvSpPr>
-        <p:spPr/>
-        <p:txBody>
-          <a:bodyPr/>
-          <a:lstStyle/>
-          <a:p>
-            <a:r>
-              <a:rPr lang="en-GB" dirty="0" smtClean="0"/>
-              <a:t>Directing characters to matching goal platform</a:t>
-            </a:r>
-          </a:p>
-          <a:p>
-            <a:r>
-              <a:rPr lang="en-GB" dirty="0" smtClean="0"/>
-              <a:t>Multiple characters to direct</a:t>
-            </a:r>
-          </a:p>
-          <a:p>
-            <a:r>
-              <a:rPr lang="en-GB" dirty="0" smtClean="0"/>
-              <a:t>Varying Speed</a:t>
-            </a:r>
-          </a:p>
-          <a:p>
-            <a:r>
-              <a:rPr lang="en-GB" dirty="0" smtClean="0"/>
-              <a:t>Level Complexity</a:t>
-            </a:r>
-          </a:p>
-          <a:p>
-            <a:r>
-              <a:rPr lang="en-GB" dirty="0" smtClean="0"/>
-              <a:t>Varying Platforms</a:t>
-            </a:r>
-          </a:p>
-          <a:p>
-            <a:pPr>
-              <a:buNone/>
-            </a:pPr>
-            <a:endParaRPr lang="en-GB" dirty="0"/>
-          </a:p>
-        </p:txBody>
-      </p:sp>
-    </p:spTree>
-  </p:cSld>
-  <p:clrMapOvr>
-    <a:masterClrMapping/>
-  </p:clrMapOvr>
-</p:sld>
-</file>
-
-<file path=ppt/slides/slide11.xml><?xml version="1.0" encoding="utf-8"?>
-<p:sld xmlns:a="http://schemas.openxmlformats.org/drawingml/2006/main" xmlns:r="http://schemas.openxmlformats.org/officeDocument/2006/relationships" xmlns:p="http://schemas.openxmlformats.org/presentationml/2006/main">
-  <p:cSld>
-    <p:spTree>
-      <p:nvGrpSpPr>
-        <p:cNvPr id="1" name=""/>
-        <p:cNvGrpSpPr/>
-        <p:nvPr/>
-      </p:nvGrpSpPr>
-      <p:grpSpPr>
-        <a:xfrm>
-          <a:off x="0" y="0"/>
-          <a:ext cx="0" cy="0"/>
-          <a:chOff x="0" y="0"/>
-          <a:chExt cx="0" cy="0"/>
-        </a:xfrm>
-      </p:grpSpPr>
-      <p:sp>
-        <p:nvSpPr>
-          <p:cNvPr id="2" name="Title 1"/>
-          <p:cNvSpPr>
-            <a:spLocks noGrp="1"/>
-          </p:cNvSpPr>
-          <p:nvPr>
-            <p:ph type="title"/>
-          </p:nvPr>
-        </p:nvSpPr>
-        <p:spPr/>
-        <p:txBody>
-          <a:bodyPr/>
-          <a:lstStyle/>
-          <a:p>
-            <a:r>
-              <a:rPr lang="en-GB" dirty="0" smtClean="0"/>
-              <a:t>Idea 2 – Moodboards and Style Guide</a:t>
-            </a:r>
-            <a:endParaRPr lang="en-GB" dirty="0"/>
-          </a:p>
-        </p:txBody>
-      </p:sp>
-      <p:sp>
-        <p:nvSpPr>
-          <p:cNvPr id="3" name="Content Placeholder 2"/>
-          <p:cNvSpPr>
-            <a:spLocks noGrp="1"/>
-          </p:cNvSpPr>
-          <p:nvPr>
-            <p:ph idx="1"/>
-          </p:nvPr>
-        </p:nvSpPr>
-        <p:spPr/>
-        <p:txBody>
-          <a:bodyPr/>
-          <a:lstStyle/>
-          <a:p>
-            <a:endParaRPr lang="en-GB"/>
-          </a:p>
-        </p:txBody>
-      </p:sp>
-    </p:spTree>
-  </p:cSld>
-  <p:clrMapOvr>
-    <a:masterClrMapping/>
-  </p:clrMapOvr>
-</p:sld>
-</file>
-
-<file path=ppt/slides/slide12.xml><?xml version="1.0" encoding="utf-8"?>
-<p:sld xmlns:a="http://schemas.openxmlformats.org/drawingml/2006/main" xmlns:r="http://schemas.openxmlformats.org/officeDocument/2006/relationships" xmlns:p="http://schemas.openxmlformats.org/presentationml/2006/main">
-  <p:cSld>
-    <p:spTree>
-      <p:nvGrpSpPr>
-        <p:cNvPr id="1" name=""/>
-        <p:cNvGrpSpPr/>
-        <p:nvPr/>
-      </p:nvGrpSpPr>
-      <p:grpSpPr>
-        <a:xfrm>
-          <a:off x="0" y="0"/>
-          <a:ext cx="0" cy="0"/>
-          <a:chOff x="0" y="0"/>
-          <a:chExt cx="0" cy="0"/>
-        </a:xfrm>
-      </p:grpSpPr>
-      <p:sp>
-        <p:nvSpPr>
-          <p:cNvPr id="2" name="Title 1"/>
-          <p:cNvSpPr>
-            <a:spLocks noGrp="1"/>
-          </p:cNvSpPr>
-          <p:nvPr>
-            <p:ph type="title"/>
-          </p:nvPr>
-        </p:nvSpPr>
-        <p:spPr/>
-        <p:txBody>
-          <a:bodyPr/>
-          <a:lstStyle/>
-          <a:p>
-            <a:r>
-              <a:rPr lang="en-GB" dirty="0" smtClean="0"/>
-              <a:t>Idea </a:t>
-            </a:r>
-            <a:r>
-              <a:rPr lang="en-GB" dirty="0"/>
-              <a:t>3- Demographic</a:t>
-            </a:r>
-            <a:endParaRPr lang="en-GB" dirty="0"/>
-          </a:p>
-        </p:txBody>
-      </p:sp>
-      <p:sp>
-        <p:nvSpPr>
-          <p:cNvPr id="3" name="Content Placeholder 2"/>
-          <p:cNvSpPr>
-            <a:spLocks noGrp="1"/>
-          </p:cNvSpPr>
-          <p:nvPr>
-            <p:ph idx="1"/>
-          </p:nvPr>
-        </p:nvSpPr>
-        <p:spPr/>
-        <p:txBody>
-          <a:bodyPr/>
-          <a:lstStyle/>
-          <a:p>
-            <a:r>
-              <a:rPr lang="en-GB" dirty="0"/>
-              <a:t>Age: 25-34</a:t>
-            </a:r>
-          </a:p>
-          <a:p>
-            <a:r>
-              <a:rPr lang="en-GB" dirty="0"/>
-              <a:t>Gender: Female</a:t>
-            </a:r>
-          </a:p>
-          <a:p>
-            <a:r>
-              <a:rPr lang="en-GB" dirty="0" smtClean="0"/>
-              <a:t>Hard Fun:</a:t>
-            </a:r>
-            <a:endParaRPr lang="en-GB" dirty="0"/>
-          </a:p>
-        </p:txBody>
-      </p:sp>
-    </p:spTree>
-  </p:cSld>
-  <p:clrMapOvr>
-    <a:masterClrMapping/>
-  </p:clrMapOvr>
-</p:sld>
-</file>
-
-<file path=ppt/slides/slide13.xml><?xml version="1.0" encoding="utf-8"?>
-<p:sld xmlns:a="http://schemas.openxmlformats.org/drawingml/2006/main" xmlns:r="http://schemas.openxmlformats.org/officeDocument/2006/relationships" xmlns:p="http://schemas.openxmlformats.org/presentationml/2006/main">
-  <p:cSld>
-    <p:spTree>
-      <p:nvGrpSpPr>
-        <p:cNvPr id="1" name=""/>
-        <p:cNvGrpSpPr/>
-        <p:nvPr/>
-      </p:nvGrpSpPr>
-      <p:grpSpPr>
-        <a:xfrm>
-          <a:off x="0" y="0"/>
-          <a:ext cx="0" cy="0"/>
-          <a:chOff x="0" y="0"/>
-          <a:chExt cx="0" cy="0"/>
-        </a:xfrm>
-      </p:grpSpPr>
-      <p:sp>
-        <p:nvSpPr>
-          <p:cNvPr id="2" name="Title 1"/>
-          <p:cNvSpPr>
-            <a:spLocks noGrp="1"/>
-          </p:cNvSpPr>
-          <p:nvPr>
-            <p:ph type="title"/>
-          </p:nvPr>
-        </p:nvSpPr>
-        <p:spPr/>
-        <p:txBody>
-          <a:bodyPr/>
-          <a:lstStyle/>
-          <a:p>
-            <a:r>
-              <a:rPr lang="en-GB" dirty="0"/>
-              <a:t>Idea 3- </a:t>
-            </a:r>
-            <a:r>
-              <a:rPr lang="en-GB" dirty="0" smtClean="0"/>
-              <a:t>Platform </a:t>
-            </a:r>
-            <a:r>
-              <a:rPr lang="en-GB" dirty="0"/>
-              <a:t>and Genre</a:t>
-            </a:r>
-            <a:endParaRPr lang="en-GB" dirty="0"/>
-          </a:p>
-        </p:txBody>
-      </p:sp>
-      <p:sp>
-        <p:nvSpPr>
-          <p:cNvPr id="3" name="Content Placeholder 2"/>
-          <p:cNvSpPr>
-            <a:spLocks noGrp="1"/>
-          </p:cNvSpPr>
-          <p:nvPr>
-            <p:ph idx="1"/>
-          </p:nvPr>
-        </p:nvSpPr>
-        <p:spPr/>
-        <p:txBody>
-          <a:bodyPr/>
-          <a:lstStyle/>
-          <a:p>
-            <a:r>
-              <a:rPr lang="en-GB" dirty="0"/>
-              <a:t>Platform: Mobile and Tablet</a:t>
-            </a:r>
-          </a:p>
-          <a:p>
-            <a:r>
-              <a:rPr lang="en-GB" dirty="0"/>
-              <a:t>Genre: Puzzle</a:t>
-            </a:r>
-          </a:p>
-          <a:p>
-            <a:r>
-              <a:rPr lang="en-GB" dirty="0"/>
-              <a:t>Duration: 1</a:t>
-            </a:r>
-            <a:r>
-              <a:rPr lang="en-GB" dirty="0" smtClean="0"/>
-              <a:t> minutes per life with up to 6 mins of play when all lives are used at once</a:t>
-            </a:r>
-            <a:endParaRPr lang="en-GB" dirty="0"/>
-          </a:p>
-          <a:p>
-            <a:endParaRPr lang="en-GB" dirty="0"/>
-          </a:p>
-        </p:txBody>
-      </p:sp>
-    </p:spTree>
-  </p:cSld>
-  <p:clrMapOvr>
-    <a:masterClrMapping/>
-  </p:clrMapOvr>
-</p:sld>
-</file>
-
-<file path=ppt/slides/slide14.xml><?xml version="1.0" encoding="utf-8"?>
-<p:sld xmlns:a="http://schemas.openxmlformats.org/drawingml/2006/main" xmlns:r="http://schemas.openxmlformats.org/officeDocument/2006/relationships" xmlns:p="http://schemas.openxmlformats.org/presentationml/2006/main">
-  <p:cSld>
-    <p:spTree>
-      <p:nvGrpSpPr>
-        <p:cNvPr id="1" name=""/>
-        <p:cNvGrpSpPr/>
-        <p:nvPr/>
-      </p:nvGrpSpPr>
-      <p:grpSpPr>
-        <a:xfrm>
-          <a:off x="0" y="0"/>
-          <a:ext cx="0" cy="0"/>
-          <a:chOff x="0" y="0"/>
-          <a:chExt cx="0" cy="0"/>
-        </a:xfrm>
-      </p:grpSpPr>
-      <p:sp>
-        <p:nvSpPr>
-          <p:cNvPr id="2" name="Title 1"/>
-          <p:cNvSpPr>
-            <a:spLocks noGrp="1"/>
-          </p:cNvSpPr>
-          <p:nvPr>
-            <p:ph type="title"/>
-          </p:nvPr>
-        </p:nvSpPr>
-        <p:spPr/>
-        <p:txBody>
-          <a:bodyPr/>
-          <a:lstStyle/>
-          <a:p>
-            <a:r>
-              <a:rPr lang="en-GB" dirty="0" smtClean="0"/>
-              <a:t>Idea 3- Game </a:t>
-            </a:r>
-            <a:r>
-              <a:rPr lang="en-GB" dirty="0"/>
-              <a:t>Loop</a:t>
-            </a:r>
-            <a:endParaRPr lang="en-GB" dirty="0"/>
-          </a:p>
-        </p:txBody>
-      </p:sp>
-      <p:sp>
-        <p:nvSpPr>
-          <p:cNvPr id="3" name="Content Placeholder 2"/>
-          <p:cNvSpPr>
-            <a:spLocks noGrp="1"/>
-          </p:cNvSpPr>
-          <p:nvPr>
-            <p:ph idx="1"/>
-          </p:nvPr>
-        </p:nvSpPr>
-        <p:spPr>
-          <a:xfrm>
-            <a:off x="457200" y="4105374"/>
-            <a:ext cx="8229600" cy="2491978"/>
-          </a:xfrm>
-        </p:spPr>
-        <p:txBody>
-          <a:bodyPr>
-            <a:normAutofit lnSpcReduction="10000"/>
-          </a:bodyPr>
-          <a:lstStyle/>
-          <a:p>
-            <a:r>
-              <a:rPr lang="en-GB" dirty="0" smtClean="0"/>
-              <a:t>Player’s have a minute to come up with as many words as they can using the giving letters</a:t>
-            </a:r>
-          </a:p>
-          <a:p>
-            <a:r>
-              <a:rPr lang="en-GB" dirty="0" smtClean="0"/>
-              <a:t>Soft </a:t>
-            </a:r>
-            <a:r>
-              <a:rPr lang="en-GB" dirty="0"/>
-              <a:t>Currency – Power Ups</a:t>
-            </a:r>
-          </a:p>
-          <a:p>
-            <a:r>
-              <a:rPr lang="en-GB" dirty="0"/>
-              <a:t>Hard Currency </a:t>
-            </a:r>
-            <a:r>
-              <a:rPr lang="en-GB" dirty="0" smtClean="0"/>
-              <a:t>– Refill your lives</a:t>
-            </a:r>
-            <a:endParaRPr lang="en-GB" dirty="0"/>
-          </a:p>
-        </p:txBody>
-      </p:sp>
-      <p:sp>
-        <p:nvSpPr>
-          <p:cNvPr id="4" name="Bent-Up Arrow 3"/>
-          <p:cNvSpPr/>
-          <p:nvPr/>
-        </p:nvSpPr>
-        <p:spPr>
-          <a:xfrm rot="10800000" flipH="1">
-            <a:off x="5076056" y="1761184"/>
-            <a:ext cx="864096" cy="1296144"/>
-          </a:xfrm>
-          <a:prstGeom prst="bentUpArrow">
-            <a:avLst/>
-          </a:prstGeom>
-        </p:spPr>
-        <p:style>
-          <a:lnRef idx="2">
-            <a:schemeClr val="accent1">
-              <a:shade val="50000"/>
-            </a:schemeClr>
-          </a:lnRef>
-          <a:fillRef idx="1">
-            <a:schemeClr val="accent1"/>
-          </a:fillRef>
-          <a:effectRef idx="0">
-            <a:schemeClr val="accent1"/>
-          </a:effectRef>
-          <a:fontRef idx="minor">
-            <a:schemeClr val="lt1"/>
-          </a:fontRef>
-        </p:style>
-        <p:txBody>
-          <a:bodyPr rtlCol="0" anchor="ctr"/>
-          <a:lstStyle/>
-          <a:p>
-            <a:pPr algn="ctr"/>
-            <a:endParaRPr lang="en-GB"/>
-          </a:p>
-        </p:txBody>
-      </p:sp>
-      <p:sp>
-        <p:nvSpPr>
-          <p:cNvPr id="5" name="Bent-Up Arrow 4"/>
-          <p:cNvSpPr/>
-          <p:nvPr/>
-        </p:nvSpPr>
-        <p:spPr>
-          <a:xfrm rot="5400000" flipH="1">
-            <a:off x="2475837" y="1941204"/>
-            <a:ext cx="1368152" cy="864096"/>
-          </a:xfrm>
-          <a:prstGeom prst="bentUpArrow">
-            <a:avLst/>
-          </a:prstGeom>
-        </p:spPr>
-        <p:style>
-          <a:lnRef idx="2">
-            <a:schemeClr val="accent1">
-              <a:shade val="50000"/>
-            </a:schemeClr>
-          </a:lnRef>
-          <a:fillRef idx="1">
-            <a:schemeClr val="accent1"/>
-          </a:fillRef>
-          <a:effectRef idx="0">
-            <a:schemeClr val="accent1"/>
-          </a:effectRef>
-          <a:fontRef idx="minor">
-            <a:schemeClr val="lt1"/>
-          </a:fontRef>
-        </p:style>
-        <p:txBody>
-          <a:bodyPr rtlCol="0" anchor="ctr"/>
-          <a:lstStyle/>
-          <a:p>
-            <a:pPr algn="ctr"/>
-            <a:endParaRPr lang="en-GB"/>
-          </a:p>
-        </p:txBody>
-      </p:sp>
-      <p:sp>
-        <p:nvSpPr>
-          <p:cNvPr id="6" name="Down Arrow 5"/>
-          <p:cNvSpPr/>
-          <p:nvPr/>
-        </p:nvSpPr>
-        <p:spPr>
-          <a:xfrm rot="5400000">
-            <a:off x="3771981" y="2805300"/>
-            <a:ext cx="504056" cy="1152128"/>
-          </a:xfrm>
-          <a:prstGeom prst="downArrow">
-            <a:avLst/>
-          </a:prstGeom>
-        </p:spPr>
-        <p:style>
-          <a:lnRef idx="2">
-            <a:schemeClr val="accent1">
-              <a:shade val="50000"/>
-            </a:schemeClr>
-          </a:lnRef>
-          <a:fillRef idx="1">
-            <a:schemeClr val="accent1"/>
-          </a:fillRef>
-          <a:effectRef idx="0">
-            <a:schemeClr val="accent1"/>
-          </a:effectRef>
-          <a:fontRef idx="minor">
-            <a:schemeClr val="lt1"/>
-          </a:fontRef>
-        </p:style>
-        <p:txBody>
-          <a:bodyPr rtlCol="0" anchor="ctr"/>
-          <a:lstStyle/>
-          <a:p>
-            <a:pPr algn="ctr"/>
-            <a:endParaRPr lang="en-GB"/>
-          </a:p>
-        </p:txBody>
-      </p:sp>
-      <p:sp>
-        <p:nvSpPr>
-          <p:cNvPr id="10" name="TextBox 9"/>
-          <p:cNvSpPr txBox="1"/>
-          <p:nvPr/>
-        </p:nvSpPr>
-        <p:spPr>
-          <a:xfrm>
-            <a:off x="3613929" y="1689176"/>
-            <a:ext cx="1368152" cy="369332"/>
-          </a:xfrm>
-          <a:prstGeom prst="rect">
-            <a:avLst/>
-          </a:prstGeom>
-          <a:noFill/>
-        </p:spPr>
-        <p:txBody>
-          <a:bodyPr wrap="square" rtlCol="0">
-            <a:spAutoFit/>
-          </a:bodyPr>
-          <a:lstStyle/>
-          <a:p>
-            <a:r>
-              <a:rPr lang="en-GB" dirty="0" smtClean="0"/>
-              <a:t>Use a Life</a:t>
-            </a:r>
-            <a:endParaRPr lang="en-GB" dirty="0"/>
-          </a:p>
-        </p:txBody>
-      </p:sp>
-      <p:sp>
-        <p:nvSpPr>
-          <p:cNvPr id="11" name="TextBox 10"/>
-          <p:cNvSpPr txBox="1"/>
-          <p:nvPr/>
-        </p:nvSpPr>
-        <p:spPr>
-          <a:xfrm>
-            <a:off x="2367825" y="3007413"/>
-            <a:ext cx="1152128" cy="646331"/>
-          </a:xfrm>
-          <a:prstGeom prst="rect">
-            <a:avLst/>
-          </a:prstGeom>
-          <a:noFill/>
-        </p:spPr>
-        <p:txBody>
-          <a:bodyPr wrap="square" rtlCol="0">
-            <a:spAutoFit/>
-          </a:bodyPr>
-          <a:lstStyle/>
-          <a:p>
-            <a:r>
-              <a:rPr lang="en-GB" dirty="0" smtClean="0"/>
-              <a:t>Earn rewards</a:t>
-            </a:r>
-            <a:endParaRPr lang="en-GB" dirty="0"/>
-          </a:p>
-        </p:txBody>
-      </p:sp>
-      <p:sp>
-        <p:nvSpPr>
-          <p:cNvPr id="12" name="TextBox 11"/>
-          <p:cNvSpPr txBox="1"/>
-          <p:nvPr/>
-        </p:nvSpPr>
-        <p:spPr>
-          <a:xfrm>
-            <a:off x="4600073" y="2949987"/>
-            <a:ext cx="2448272" cy="923330"/>
-          </a:xfrm>
-          <a:prstGeom prst="rect">
-            <a:avLst/>
-          </a:prstGeom>
-          <a:noFill/>
-        </p:spPr>
-        <p:txBody>
-          <a:bodyPr wrap="square" rtlCol="0">
-            <a:spAutoFit/>
-          </a:bodyPr>
-          <a:lstStyle/>
-          <a:p>
-            <a:r>
-              <a:rPr lang="en-GB" dirty="0" smtClean="0"/>
-              <a:t>Make as many words as you can in a minute</a:t>
-            </a:r>
-            <a:endParaRPr lang="en-GB" dirty="0"/>
-          </a:p>
-        </p:txBody>
-      </p:sp>
-    </p:spTree>
-  </p:cSld>
-  <p:clrMapOvr>
-    <a:masterClrMapping/>
-  </p:clrMapOvr>
-</p:sld>
-</file>
-
-<file path=ppt/slides/slide15.xml><?xml version="1.0" encoding="utf-8"?>
-<p:sld xmlns:a="http://schemas.openxmlformats.org/drawingml/2006/main" xmlns:r="http://schemas.openxmlformats.org/officeDocument/2006/relationships" xmlns:p="http://schemas.openxmlformats.org/presentationml/2006/main">
-  <p:cSld>
-    <p:spTree>
-      <p:nvGrpSpPr>
-        <p:cNvPr id="1" name=""/>
-        <p:cNvGrpSpPr/>
-        <p:nvPr/>
-      </p:nvGrpSpPr>
-      <p:grpSpPr>
-        <a:xfrm>
-          <a:off x="0" y="0"/>
-          <a:ext cx="0" cy="0"/>
-          <a:chOff x="0" y="0"/>
-          <a:chExt cx="0" cy="0"/>
-        </a:xfrm>
-      </p:grpSpPr>
-      <p:sp>
-        <p:nvSpPr>
-          <p:cNvPr id="2" name="Title 1"/>
-          <p:cNvSpPr>
-            <a:spLocks noGrp="1"/>
-          </p:cNvSpPr>
-          <p:nvPr>
-            <p:ph type="title"/>
-          </p:nvPr>
-        </p:nvSpPr>
-        <p:spPr/>
-        <p:txBody>
-          <a:bodyPr/>
-          <a:lstStyle/>
-          <a:p>
-            <a:r>
-              <a:rPr lang="en-GB" dirty="0"/>
-              <a:t>Idea </a:t>
-            </a:r>
-            <a:r>
-              <a:rPr lang="en-GB" dirty="0" smtClean="0"/>
-              <a:t>3 </a:t>
-            </a:r>
-            <a:r>
-              <a:rPr lang="en-GB" dirty="0"/>
-              <a:t>- Challenges</a:t>
-            </a:r>
-            <a:endParaRPr lang="en-GB" dirty="0"/>
-          </a:p>
-        </p:txBody>
-      </p:sp>
-      <p:sp>
-        <p:nvSpPr>
-          <p:cNvPr id="3" name="Content Placeholder 2"/>
-          <p:cNvSpPr>
-            <a:spLocks noGrp="1"/>
-          </p:cNvSpPr>
-          <p:nvPr>
-            <p:ph idx="1"/>
-          </p:nvPr>
-        </p:nvSpPr>
-        <p:spPr/>
-        <p:txBody>
-          <a:bodyPr/>
-          <a:lstStyle/>
-          <a:p>
-            <a:r>
-              <a:rPr lang="en-GB" dirty="0" smtClean="0"/>
-              <a:t>Fast paced</a:t>
-            </a:r>
-          </a:p>
-          <a:p>
-            <a:r>
-              <a:rPr lang="en-GB" dirty="0" smtClean="0"/>
-              <a:t>Mental challenge</a:t>
-            </a:r>
-          </a:p>
-          <a:p>
-            <a:r>
-              <a:rPr lang="en-GB" dirty="0" smtClean="0"/>
-              <a:t>Varying amount of letters</a:t>
-            </a:r>
-          </a:p>
-          <a:p>
-            <a:endParaRPr lang="en-GB" dirty="0" smtClean="0"/>
-          </a:p>
-          <a:p>
-            <a:endParaRPr lang="en-GB" dirty="0" smtClean="0"/>
-          </a:p>
-        </p:txBody>
-      </p:sp>
-    </p:spTree>
-  </p:cSld>
-  <p:clrMapOvr>
-    <a:masterClrMapping/>
-  </p:clrMapOvr>
-</p:sld>
-</file>
-
-<file path=ppt/slides/slide16.xml><?xml version="1.0" encoding="utf-8"?>
-<p:sld xmlns:a="http://schemas.openxmlformats.org/drawingml/2006/main" xmlns:r="http://schemas.openxmlformats.org/officeDocument/2006/relationships" xmlns:p="http://schemas.openxmlformats.org/presentationml/2006/main">
-  <p:cSld>
-    <p:spTree>
-      <p:nvGrpSpPr>
-        <p:cNvPr id="1" name=""/>
-        <p:cNvGrpSpPr/>
-        <p:nvPr/>
-      </p:nvGrpSpPr>
-      <p:grpSpPr>
-        <a:xfrm>
-          <a:off x="0" y="0"/>
-          <a:ext cx="0" cy="0"/>
-          <a:chOff x="0" y="0"/>
-          <a:chExt cx="0" cy="0"/>
-        </a:xfrm>
-      </p:grpSpPr>
-      <p:sp>
-        <p:nvSpPr>
-          <p:cNvPr id="2" name="Title 1"/>
-          <p:cNvSpPr>
-            <a:spLocks noGrp="1"/>
-          </p:cNvSpPr>
-          <p:nvPr>
-            <p:ph type="title"/>
-          </p:nvPr>
-        </p:nvSpPr>
-        <p:spPr/>
-        <p:txBody>
-          <a:bodyPr/>
-          <a:lstStyle/>
-          <a:p>
-            <a:r>
-              <a:rPr lang="en-GB" dirty="0"/>
-              <a:t>Idea </a:t>
-            </a:r>
-            <a:r>
-              <a:rPr lang="en-GB" dirty="0" smtClean="0"/>
-              <a:t>3 </a:t>
-            </a:r>
-            <a:r>
-              <a:rPr lang="en-GB" dirty="0"/>
-              <a:t>– </a:t>
-            </a:r>
-            <a:r>
-              <a:rPr lang="en-GB" dirty="0" err="1"/>
-              <a:t>Moodboards</a:t>
-            </a:r>
-            <a:r>
-              <a:rPr lang="en-GB" dirty="0"/>
-              <a:t> and Style Guide</a:t>
-            </a:r>
-            <a:endParaRPr lang="en-GB" dirty="0"/>
-          </a:p>
-        </p:txBody>
-      </p:sp>
-      <p:sp>
-        <p:nvSpPr>
-          <p:cNvPr id="3" name="Content Placeholder 2"/>
-          <p:cNvSpPr>
-            <a:spLocks noGrp="1"/>
-          </p:cNvSpPr>
-          <p:nvPr>
-            <p:ph idx="1"/>
-          </p:nvPr>
-        </p:nvSpPr>
-        <p:spPr/>
-        <p:txBody>
-          <a:bodyPr/>
-          <a:lstStyle/>
-          <a:p>
-            <a:endParaRPr lang="en-GB" dirty="0"/>
-          </a:p>
-        </p:txBody>
-      </p:sp>
-    </p:spTree>
-  </p:cSld>
-  <p:clrMapOvr>
-    <a:masterClrMapping/>
-  </p:clrMapOvr>
-</p:sld>
-</file>
-
-<file path=ppt/slides/slide17.xml><?xml version="1.0" encoding="utf-8"?>
-<p:sld xmlns:a="http://schemas.openxmlformats.org/drawingml/2006/main" xmlns:r="http://schemas.openxmlformats.org/officeDocument/2006/relationships" xmlns:p="http://schemas.openxmlformats.org/presentationml/2006/main">
-  <p:cSld>
-    <p:spTree>
-      <p:nvGrpSpPr>
-        <p:cNvPr id="1" name=""/>
-        <p:cNvGrpSpPr/>
-        <p:nvPr/>
-      </p:nvGrpSpPr>
-      <p:grpSpPr>
-        <a:xfrm>
-          <a:off x="0" y="0"/>
-          <a:ext cx="0" cy="0"/>
-          <a:chOff x="0" y="0"/>
-          <a:chExt cx="0" cy="0"/>
-        </a:xfrm>
-      </p:grpSpPr>
-      <p:sp>
-        <p:nvSpPr>
-          <p:cNvPr id="2" name="Title 1"/>
-          <p:cNvSpPr>
-            <a:spLocks noGrp="1"/>
-          </p:cNvSpPr>
-          <p:nvPr>
-            <p:ph type="title"/>
-          </p:nvPr>
-        </p:nvSpPr>
-        <p:spPr>
-          <a:xfrm>
-            <a:off x="467544" y="2780928"/>
-            <a:ext cx="8229600" cy="1399032"/>
-          </a:xfrm>
-        </p:spPr>
-        <p:txBody>
-          <a:bodyPr/>
-          <a:lstStyle/>
-          <a:p>
-            <a:r>
-              <a:rPr lang="en-GB" dirty="0" smtClean="0">
-                <a:effectLst>
-                  <a:outerShdw blurRad="38100" dist="38100" dir="2700000" algn="tl">
-                    <a:srgbClr val="000000">
-                      <a:alpha val="43137"/>
-                    </a:srgbClr>
-                  </a:outerShdw>
-                </a:effectLst>
-              </a:rPr>
-              <a:t>Questions?</a:t>
-            </a:r>
-            <a:endParaRPr lang="en-GB" dirty="0">
-              <a:effectLst>
-                <a:outerShdw blurRad="38100" dist="38100" dir="2700000" algn="tl">
-                  <a:srgbClr val="000000">
-                    <a:alpha val="43137"/>
-                  </a:srgbClr>
-                </a:outerShdw>
-              </a:effectLst>
-            </a:endParaRPr>
-          </a:p>
-        </p:txBody>
-      </p:sp>
-    </p:spTree>
-    <p:extLst>
-      <p:ext uri="{BB962C8B-B14F-4D97-AF65-F5344CB8AC3E}">
-        <p14:creationId xmlns:p14="http://schemas.microsoft.com/office/powerpoint/2010/main" val="3579189080"/>
-      </p:ext>
-    </p:extLst>
-  </p:cSld>
-  <p:clrMapOvr>
-    <a:masterClrMapping/>
-  </p:clrMapOvr>
-</p:sld>
-</file>
-
-<file path=ppt/slides/slide18.xml><?xml version="1.0" encoding="utf-8"?>
-<p:sld xmlns:a="http://schemas.openxmlformats.org/drawingml/2006/main" xmlns:r="http://schemas.openxmlformats.org/officeDocument/2006/relationships" xmlns:p="http://schemas.openxmlformats.org/presentationml/2006/main">
-  <p:cSld>
-    <p:spTree>
-      <p:nvGrpSpPr>
-        <p:cNvPr id="1" name=""/>
-        <p:cNvGrpSpPr/>
-        <p:nvPr/>
-      </p:nvGrpSpPr>
-      <p:grpSpPr>
-        <a:xfrm>
-          <a:off x="0" y="0"/>
-          <a:ext cx="0" cy="0"/>
-          <a:chOff x="0" y="0"/>
-          <a:chExt cx="0" cy="0"/>
-        </a:xfrm>
-      </p:grpSpPr>
-      <p:sp>
-        <p:nvSpPr>
-          <p:cNvPr id="2" name="Title 1"/>
-          <p:cNvSpPr>
-            <a:spLocks noGrp="1"/>
-          </p:cNvSpPr>
-          <p:nvPr>
-            <p:ph type="title"/>
-          </p:nvPr>
-        </p:nvSpPr>
-        <p:spPr/>
-        <p:txBody>
-          <a:bodyPr/>
-          <a:lstStyle/>
-          <a:p>
-            <a:endParaRPr lang="en-GB" dirty="0"/>
-          </a:p>
-        </p:txBody>
-      </p:sp>
-      <p:sp>
-        <p:nvSpPr>
-          <p:cNvPr id="3" name="Content Placeholder 2"/>
-          <p:cNvSpPr>
-            <a:spLocks noGrp="1"/>
-          </p:cNvSpPr>
-          <p:nvPr>
-            <p:ph idx="1"/>
-          </p:nvPr>
-        </p:nvSpPr>
-        <p:spPr/>
-        <p:txBody>
-          <a:bodyPr>
-            <a:normAutofit fontScale="92500" lnSpcReduction="20000"/>
-          </a:bodyPr>
-          <a:lstStyle/>
-          <a:p>
-            <a:r>
-              <a:rPr lang="en-GB" dirty="0" smtClean="0">
-                <a:hlinkClick r:id="rId2"/>
-              </a:rPr>
-              <a:t>http://www.ampush.com/blog/the-fastest-growing-mobile-gaming-audience-women/</a:t>
-            </a:r>
-            <a:endParaRPr lang="en-GB" dirty="0" smtClean="0"/>
-          </a:p>
-          <a:p>
-            <a:r>
-              <a:rPr lang="en-GB" dirty="0" smtClean="0">
-                <a:hlinkClick r:id="rId3"/>
-              </a:rPr>
-              <a:t>http://www.realitymine.com/myth-busting-mobile-gaming-demographics/</a:t>
-            </a:r>
-            <a:endParaRPr lang="en-GB" dirty="0" smtClean="0"/>
-          </a:p>
-          <a:p>
-            <a:r>
-              <a:rPr lang="en-GB" dirty="0" smtClean="0">
-                <a:hlinkClick r:id="rId4"/>
-              </a:rPr>
-              <a:t>http://www.adweek.com/brand-marketing/infographic-how-mobile-use-varies-across-generations-166426/</a:t>
-            </a:r>
-            <a:endParaRPr lang="en-GB" dirty="0" smtClean="0"/>
-          </a:p>
-          <a:p>
-            <a:r>
-              <a:rPr lang="en-GB" dirty="0" smtClean="0">
-                <a:hlinkClick r:id="rId5"/>
-              </a:rPr>
-              <a:t>https://www.nyfa.edu/student-resources/learning-from-the-best-puzzle-games/</a:t>
-            </a:r>
-            <a:endParaRPr lang="en-GB" dirty="0" smtClean="0"/>
-          </a:p>
-          <a:p>
-            <a:r>
-              <a:rPr lang="en-GB" dirty="0" smtClean="0">
-                <a:hlinkClick r:id="rId6"/>
-              </a:rPr>
-              <a:t>https://vungle.com/blog/2015/04/27/the-6-rules-of-a-hit-puzzle-game/</a:t>
-            </a:r>
-            <a:endParaRPr lang="en-GB" dirty="0" smtClean="0"/>
-          </a:p>
-          <a:p>
-            <a:endParaRPr lang="en-GB" dirty="0"/>
-          </a:p>
-        </p:txBody>
-      </p:sp>
-    </p:spTree>
-  </p:cSld>
-  <p:clrMapOvr>
-    <a:masterClrMapping/>
-  </p:clrMapOvr>
-</p:sld>
-</file>
-
-<file path=ppt/slides/slide2.xml><?xml version="1.0" encoding="utf-8"?>
-<p:sld xmlns:a="http://schemas.openxmlformats.org/drawingml/2006/main" xmlns:r="http://schemas.openxmlformats.org/officeDocument/2006/relationships" xmlns:p="http://schemas.openxmlformats.org/presentationml/2006/main">
-  <p:cSld>
-    <p:spTree>
-      <p:nvGrpSpPr>
-        <p:cNvPr id="1" name=""/>
-        <p:cNvGrpSpPr/>
-        <p:nvPr/>
-      </p:nvGrpSpPr>
-      <p:grpSpPr>
-        <a:xfrm>
-          <a:off x="0" y="0"/>
-          <a:ext cx="0" cy="0"/>
-          <a:chOff x="0" y="0"/>
-          <a:chExt cx="0" cy="0"/>
-        </a:xfrm>
-      </p:grpSpPr>
-      <p:sp>
-        <p:nvSpPr>
-          <p:cNvPr id="2" name="Title 1"/>
-          <p:cNvSpPr>
-            <a:spLocks noGrp="1"/>
-          </p:cNvSpPr>
-          <p:nvPr>
-            <p:ph type="title"/>
-          </p:nvPr>
-        </p:nvSpPr>
-        <p:spPr/>
-        <p:txBody>
-          <a:bodyPr/>
-          <a:lstStyle/>
-          <a:p>
-            <a:r>
-              <a:rPr lang="en-GB" dirty="0" smtClean="0"/>
-              <a:t>Idea 1- </a:t>
-            </a:r>
-            <a:endParaRPr lang="en-GB" dirty="0"/>
-          </a:p>
-        </p:txBody>
-      </p:sp>
-      <p:sp>
-        <p:nvSpPr>
-          <p:cNvPr id="3" name="Content Placeholder 2"/>
-          <p:cNvSpPr>
-            <a:spLocks noGrp="1"/>
-          </p:cNvSpPr>
-          <p:nvPr>
-            <p:ph idx="1"/>
-          </p:nvPr>
-        </p:nvSpPr>
-        <p:spPr/>
-        <p:txBody>
-          <a:bodyPr/>
-          <a:lstStyle/>
-          <a:p>
-            <a:endParaRPr lang="en-GB" dirty="0"/>
-          </a:p>
-        </p:txBody>
-      </p:sp>
-    </p:spTree>
-  </p:cSld>
-  <p:clrMapOvr>
-    <a:masterClrMapping/>
-  </p:clrMapOvr>
-</p:sld>
-</file>
-
-<file path=ppt/slides/slide3.xml><?xml version="1.0" encoding="utf-8"?>
-<p:sld xmlns:a="http://schemas.openxmlformats.org/drawingml/2006/main" xmlns:r="http://schemas.openxmlformats.org/officeDocument/2006/relationships" xmlns:p="http://schemas.openxmlformats.org/presentationml/2006/main">
-  <p:cSld>
-    <p:spTree>
-      <p:nvGrpSpPr>
-        <p:cNvPr id="1" name=""/>
-        <p:cNvGrpSpPr/>
-        <p:nvPr/>
-      </p:nvGrpSpPr>
-      <p:grpSpPr>
-        <a:xfrm>
-          <a:off x="0" y="0"/>
-          <a:ext cx="0" cy="0"/>
-          <a:chOff x="0" y="0"/>
-          <a:chExt cx="0" cy="0"/>
-        </a:xfrm>
-      </p:grpSpPr>
-      <p:sp>
-        <p:nvSpPr>
-          <p:cNvPr id="2" name="Title 1"/>
-          <p:cNvSpPr>
-            <a:spLocks noGrp="1"/>
-          </p:cNvSpPr>
-          <p:nvPr>
-            <p:ph type="title"/>
-          </p:nvPr>
-        </p:nvSpPr>
-        <p:spPr/>
-        <p:txBody>
-          <a:bodyPr/>
-          <a:lstStyle/>
-          <a:p>
-            <a:r>
-              <a:rPr lang="en-GB" dirty="0"/>
-              <a:t>Idea 1- </a:t>
-            </a:r>
-            <a:endParaRPr lang="en-GB" dirty="0"/>
-          </a:p>
-        </p:txBody>
-      </p:sp>
-      <p:sp>
-        <p:nvSpPr>
-          <p:cNvPr id="3" name="Content Placeholder 2"/>
-          <p:cNvSpPr>
-            <a:spLocks noGrp="1"/>
-          </p:cNvSpPr>
-          <p:nvPr>
-            <p:ph idx="1"/>
-          </p:nvPr>
-        </p:nvSpPr>
-        <p:spPr/>
-        <p:txBody>
-          <a:bodyPr/>
-          <a:lstStyle/>
-          <a:p>
-            <a:endParaRPr lang="en-GB"/>
-          </a:p>
-        </p:txBody>
-      </p:sp>
-    </p:spTree>
-  </p:cSld>
-  <p:clrMapOvr>
-    <a:masterClrMapping/>
-  </p:clrMapOvr>
-</p:sld>
-</file>
-
-<file path=ppt/slides/slide4.xml><?xml version="1.0" encoding="utf-8"?>
-<p:sld xmlns:a="http://schemas.openxmlformats.org/drawingml/2006/main" xmlns:r="http://schemas.openxmlformats.org/officeDocument/2006/relationships" xmlns:p="http://schemas.openxmlformats.org/presentationml/2006/main">
-  <p:cSld>
-    <p:spTree>
-      <p:nvGrpSpPr>
-        <p:cNvPr id="1" name=""/>
-        <p:cNvGrpSpPr/>
-        <p:nvPr/>
-      </p:nvGrpSpPr>
-      <p:grpSpPr>
-        <a:xfrm>
-          <a:off x="0" y="0"/>
-          <a:ext cx="0" cy="0"/>
-          <a:chOff x="0" y="0"/>
-          <a:chExt cx="0" cy="0"/>
-        </a:xfrm>
-      </p:grpSpPr>
-      <p:sp>
-        <p:nvSpPr>
-          <p:cNvPr id="2" name="Title 1"/>
-          <p:cNvSpPr>
-            <a:spLocks noGrp="1"/>
-          </p:cNvSpPr>
-          <p:nvPr>
-            <p:ph type="title"/>
-          </p:nvPr>
-        </p:nvSpPr>
-        <p:spPr/>
-        <p:txBody>
-          <a:bodyPr/>
-          <a:lstStyle/>
-          <a:p>
-            <a:r>
-              <a:rPr lang="en-GB" dirty="0"/>
-              <a:t>Idea 1- </a:t>
-            </a:r>
-            <a:endParaRPr lang="en-GB" dirty="0"/>
-          </a:p>
-        </p:txBody>
-      </p:sp>
-      <p:sp>
-        <p:nvSpPr>
-          <p:cNvPr id="3" name="Content Placeholder 2"/>
-          <p:cNvSpPr>
-            <a:spLocks noGrp="1"/>
-          </p:cNvSpPr>
-          <p:nvPr>
-            <p:ph idx="1"/>
-          </p:nvPr>
-        </p:nvSpPr>
-        <p:spPr/>
-        <p:txBody>
-          <a:bodyPr/>
-          <a:lstStyle/>
-          <a:p>
-            <a:endParaRPr lang="en-GB"/>
-          </a:p>
-        </p:txBody>
-      </p:sp>
-    </p:spTree>
-  </p:cSld>
-  <p:clrMapOvr>
-    <a:masterClrMapping/>
-  </p:clrMapOvr>
-</p:sld>
-</file>
-
-<file path=ppt/slides/slide5.xml><?xml version="1.0" encoding="utf-8"?>
-<p:sld xmlns:a="http://schemas.openxmlformats.org/drawingml/2006/main" xmlns:r="http://schemas.openxmlformats.org/officeDocument/2006/relationships" xmlns:p="http://schemas.openxmlformats.org/presentationml/2006/main">
-  <p:cSld>
-    <p:spTree>
-      <p:nvGrpSpPr>
-        <p:cNvPr id="1" name=""/>
-        <p:cNvGrpSpPr/>
-        <p:nvPr/>
-      </p:nvGrpSpPr>
-      <p:grpSpPr>
-        <a:xfrm>
-          <a:off x="0" y="0"/>
-          <a:ext cx="0" cy="0"/>
-          <a:chOff x="0" y="0"/>
-          <a:chExt cx="0" cy="0"/>
-        </a:xfrm>
-      </p:grpSpPr>
-      <p:sp>
-        <p:nvSpPr>
-          <p:cNvPr id="2" name="Title 1"/>
-          <p:cNvSpPr>
-            <a:spLocks noGrp="1"/>
-          </p:cNvSpPr>
-          <p:nvPr>
-            <p:ph type="title"/>
-          </p:nvPr>
-        </p:nvSpPr>
-        <p:spPr/>
-        <p:txBody>
-          <a:bodyPr/>
-          <a:lstStyle/>
-          <a:p>
-            <a:r>
-              <a:rPr lang="en-GB" dirty="0"/>
-              <a:t>Idea 1- </a:t>
-            </a:r>
-            <a:endParaRPr lang="en-GB" dirty="0"/>
-          </a:p>
-        </p:txBody>
-      </p:sp>
-      <p:sp>
-        <p:nvSpPr>
-          <p:cNvPr id="3" name="Content Placeholder 2"/>
-          <p:cNvSpPr>
-            <a:spLocks noGrp="1"/>
-          </p:cNvSpPr>
-          <p:nvPr>
-            <p:ph idx="1"/>
-          </p:nvPr>
-        </p:nvSpPr>
-        <p:spPr/>
-        <p:txBody>
-          <a:bodyPr/>
-          <a:lstStyle/>
-          <a:p>
-            <a:endParaRPr lang="en-GB"/>
-          </a:p>
-        </p:txBody>
-      </p:sp>
-    </p:spTree>
-  </p:cSld>
-  <p:clrMapOvr>
-    <a:masterClrMapping/>
-  </p:clrMapOvr>
-</p:sld>
-</file>
-
-<file path=ppt/slides/slide6.xml><?xml version="1.0" encoding="utf-8"?>
-<p:sld xmlns:a="http://schemas.openxmlformats.org/drawingml/2006/main" xmlns:r="http://schemas.openxmlformats.org/officeDocument/2006/relationships" xmlns:p="http://schemas.openxmlformats.org/presentationml/2006/main">
-  <p:cSld>
-    <p:spTree>
-      <p:nvGrpSpPr>
-        <p:cNvPr id="1" name=""/>
-        <p:cNvGrpSpPr/>
-        <p:nvPr/>
-      </p:nvGrpSpPr>
-      <p:grpSpPr>
-        <a:xfrm>
-          <a:off x="0" y="0"/>
-          <a:ext cx="0" cy="0"/>
-          <a:chOff x="0" y="0"/>
-          <a:chExt cx="0" cy="0"/>
-        </a:xfrm>
-      </p:grpSpPr>
-      <p:sp>
-        <p:nvSpPr>
-          <p:cNvPr id="2" name="Title 1"/>
-          <p:cNvSpPr>
-            <a:spLocks noGrp="1"/>
-          </p:cNvSpPr>
-          <p:nvPr>
-            <p:ph type="title"/>
-          </p:nvPr>
-        </p:nvSpPr>
-        <p:spPr/>
-        <p:txBody>
-          <a:bodyPr/>
-          <a:lstStyle/>
-          <a:p>
-            <a:r>
-              <a:rPr lang="en-GB" dirty="0"/>
-              <a:t>Idea 1- </a:t>
-            </a:r>
-          </a:p>
-        </p:txBody>
-      </p:sp>
-      <p:sp>
-        <p:nvSpPr>
-          <p:cNvPr id="3" name="Content Placeholder 2"/>
-          <p:cNvSpPr>
-            <a:spLocks noGrp="1"/>
-          </p:cNvSpPr>
-          <p:nvPr>
-            <p:ph idx="1"/>
-          </p:nvPr>
-        </p:nvSpPr>
-        <p:spPr/>
-        <p:txBody>
-          <a:bodyPr/>
-          <a:lstStyle/>
-          <a:p>
-            <a:endParaRPr lang="en-GB"/>
-          </a:p>
-        </p:txBody>
-      </p:sp>
-    </p:spTree>
-    <p:extLst>
-      <p:ext uri="{BB962C8B-B14F-4D97-AF65-F5344CB8AC3E}">
-        <p14:creationId xmlns:p14="http://schemas.microsoft.com/office/powerpoint/2010/main" val="650876939"/>
-      </p:ext>
-    </p:extLst>
-  </p:cSld>
-  <p:clrMapOvr>
-    <a:masterClrMapping/>
-  </p:clrMapOvr>
-</p:sld>
-</file>
-
-<file path=ppt/slides/slide7.xml><?xml version="1.0" encoding="utf-8"?>
-<p:sld xmlns:a="http://schemas.openxmlformats.org/drawingml/2006/main" xmlns:r="http://schemas.openxmlformats.org/officeDocument/2006/relationships" xmlns:p="http://schemas.openxmlformats.org/presentationml/2006/main">
-  <p:cSld>
-    <p:spTree>
-      <p:nvGrpSpPr>
-        <p:cNvPr id="1" name=""/>
-        <p:cNvGrpSpPr/>
-        <p:nvPr/>
-      </p:nvGrpSpPr>
-      <p:grpSpPr>
-        <a:xfrm>
-          <a:off x="0" y="0"/>
-          <a:ext cx="0" cy="0"/>
-          <a:chOff x="0" y="0"/>
-          <a:chExt cx="0" cy="0"/>
-        </a:xfrm>
-      </p:grpSpPr>
-      <p:sp>
-        <p:nvSpPr>
-          <p:cNvPr id="2" name="Title 1"/>
-          <p:cNvSpPr>
-            <a:spLocks noGrp="1"/>
-          </p:cNvSpPr>
-          <p:nvPr>
-            <p:ph type="title"/>
-          </p:nvPr>
-        </p:nvSpPr>
-        <p:spPr/>
-        <p:txBody>
-          <a:bodyPr/>
-          <a:lstStyle/>
-          <a:p>
-            <a:r>
-              <a:rPr lang="en-GB" dirty="0" smtClean="0"/>
-              <a:t>Idea 2 - Demographic</a:t>
-            </a:r>
-            <a:endParaRPr lang="en-GB" dirty="0"/>
-          </a:p>
-        </p:txBody>
-      </p:sp>
-      <p:sp>
-        <p:nvSpPr>
-          <p:cNvPr id="3" name="Content Placeholder 2"/>
-          <p:cNvSpPr>
-            <a:spLocks noGrp="1"/>
-          </p:cNvSpPr>
-          <p:nvPr>
-            <p:ph idx="1"/>
-          </p:nvPr>
-        </p:nvSpPr>
-        <p:spPr/>
-        <p:txBody>
-          <a:bodyPr>
-            <a:normAutofit fontScale="55000" lnSpcReduction="20000"/>
-          </a:bodyPr>
-          <a:lstStyle/>
-          <a:p>
-            <a:r>
-              <a:rPr lang="en-GB" sz="3800" dirty="0" smtClean="0"/>
-              <a:t>Age: 25-34</a:t>
-            </a:r>
-          </a:p>
-          <a:p>
-            <a:r>
-              <a:rPr lang="en-GB" sz="3800" dirty="0" smtClean="0"/>
-              <a:t>Gender: Female</a:t>
-            </a:r>
-          </a:p>
-          <a:p>
-            <a:r>
-              <a:rPr lang="en-GB" sz="3800" dirty="0" smtClean="0"/>
-              <a:t>Hard </a:t>
-            </a:r>
-            <a:r>
-              <a:rPr lang="en-GB" sz="3800" dirty="0" smtClean="0"/>
-              <a:t>Fun: </a:t>
-            </a:r>
-          </a:p>
-          <a:p>
-            <a:pPr lvl="1"/>
-            <a:r>
-              <a:rPr lang="en-GB" sz="3800" dirty="0" smtClean="0"/>
-              <a:t>Accomplishment</a:t>
-            </a:r>
-          </a:p>
-          <a:p>
-            <a:pPr lvl="1"/>
-            <a:r>
-              <a:rPr lang="en-GB" sz="3800" dirty="0" smtClean="0"/>
-              <a:t>Strategy</a:t>
-            </a:r>
-          </a:p>
-          <a:p>
-            <a:pPr lvl="1"/>
-            <a:r>
-              <a:rPr lang="en-GB" sz="3800" dirty="0" smtClean="0"/>
-              <a:t>Clear Goal</a:t>
-            </a:r>
-          </a:p>
-          <a:p>
-            <a:pPr lvl="1"/>
-            <a:endParaRPr lang="en-GB" dirty="0" smtClean="0"/>
-          </a:p>
-          <a:p>
-            <a:endParaRPr lang="en-GB" dirty="0" smtClean="0"/>
-          </a:p>
-          <a:p>
-            <a:pPr>
-              <a:buNone/>
-            </a:pPr>
-            <a:endParaRPr lang="en-GB" dirty="0"/>
-          </a:p>
-          <a:p>
-            <a:pPr>
-              <a:buNone/>
-            </a:pPr>
-            <a:endParaRPr lang="en-GB" dirty="0" smtClean="0"/>
-          </a:p>
-          <a:p>
-            <a:pPr>
-              <a:buNone/>
-            </a:pPr>
-            <a:endParaRPr lang="en-GB" dirty="0" smtClean="0"/>
-          </a:p>
-          <a:p>
-            <a:pPr>
-              <a:buNone/>
-            </a:pPr>
-            <a:endParaRPr lang="en-GB" dirty="0" smtClean="0"/>
-          </a:p>
-          <a:p>
-            <a:pPr>
-              <a:buNone/>
-            </a:pPr>
-            <a:endParaRPr lang="en-GB" dirty="0" smtClean="0"/>
-          </a:p>
-          <a:p>
-            <a:pPr>
-              <a:buNone/>
-            </a:pPr>
-            <a:endParaRPr lang="en-GB" dirty="0" smtClean="0"/>
-          </a:p>
-          <a:p>
-            <a:pPr>
-              <a:buNone/>
-            </a:pPr>
-            <a:endParaRPr lang="en-GB" sz="1100" dirty="0" smtClean="0"/>
-          </a:p>
-          <a:p>
-            <a:pPr>
-              <a:buNone/>
-            </a:pPr>
-            <a:endParaRPr lang="en-GB" sz="1100" dirty="0" smtClean="0"/>
-          </a:p>
-          <a:p>
-            <a:pPr>
-              <a:buNone/>
-            </a:pPr>
-            <a:r>
-              <a:rPr lang="en-GB" sz="1100" dirty="0" smtClean="0"/>
-              <a:t>Source: http://www.realitymine.com/myth-busting-mobile-gaming-demographics/</a:t>
-            </a:r>
-          </a:p>
-        </p:txBody>
-      </p:sp>
-      <p:pic>
-        <p:nvPicPr>
-          <p:cNvPr id="24578" name="Picture 2" descr="Mobile gaming: age of mobile gamers"/>
-          <p:cNvPicPr>
-            <a:picLocks noChangeAspect="1" noChangeArrowheads="1"/>
-          </p:cNvPicPr>
-          <p:nvPr/>
-        </p:nvPicPr>
-        <p:blipFill>
-          <a:blip r:embed="rId2" cstate="print"/>
-          <a:srcRect/>
-          <a:stretch>
-            <a:fillRect/>
-          </a:stretch>
-        </p:blipFill>
-        <p:spPr bwMode="auto">
-          <a:xfrm>
-            <a:off x="4499992" y="1934319"/>
-            <a:ext cx="3754047" cy="2286769"/>
-          </a:xfrm>
-          <a:prstGeom prst="rect">
-            <a:avLst/>
-          </a:prstGeom>
-          <a:noFill/>
-        </p:spPr>
-      </p:pic>
-    </p:spTree>
-  </p:cSld>
-  <p:clrMapOvr>
-    <a:masterClrMapping/>
-  </p:clrMapOvr>
-</p:sld>
-</file>
-
-<file path=ppt/slides/slide8.xml><?xml version="1.0" encoding="utf-8"?>
-<p:sld xmlns:a="http://schemas.openxmlformats.org/drawingml/2006/main" xmlns:r="http://schemas.openxmlformats.org/officeDocument/2006/relationships" xmlns:p="http://schemas.openxmlformats.org/presentationml/2006/main">
-  <p:cSld>
-    <p:spTree>
-      <p:nvGrpSpPr>
-        <p:cNvPr id="1" name=""/>
-        <p:cNvGrpSpPr/>
-        <p:nvPr/>
-      </p:nvGrpSpPr>
-      <p:grpSpPr>
-        <a:xfrm>
-          <a:off x="0" y="0"/>
-          <a:ext cx="0" cy="0"/>
-          <a:chOff x="0" y="0"/>
-          <a:chExt cx="0" cy="0"/>
-        </a:xfrm>
-      </p:grpSpPr>
-      <p:sp>
-        <p:nvSpPr>
-          <p:cNvPr id="2" name="Title 1"/>
-          <p:cNvSpPr>
-            <a:spLocks noGrp="1"/>
-          </p:cNvSpPr>
-          <p:nvPr>
-            <p:ph type="title"/>
-          </p:nvPr>
-        </p:nvSpPr>
-        <p:spPr/>
-        <p:txBody>
-          <a:bodyPr/>
-          <a:lstStyle/>
-          <a:p>
-            <a:r>
-              <a:rPr lang="en-GB" dirty="0" smtClean="0"/>
-              <a:t>Idea 2 – Platform and Genre</a:t>
-            </a:r>
-            <a:endParaRPr lang="en-GB" dirty="0"/>
-          </a:p>
-        </p:txBody>
-      </p:sp>
-      <p:sp>
-        <p:nvSpPr>
-          <p:cNvPr id="3" name="Content Placeholder 2"/>
-          <p:cNvSpPr>
-            <a:spLocks noGrp="1"/>
-          </p:cNvSpPr>
-          <p:nvPr>
-            <p:ph idx="1"/>
-          </p:nvPr>
-        </p:nvSpPr>
-        <p:spPr/>
-        <p:txBody>
-          <a:bodyPr>
-            <a:normAutofit/>
-          </a:bodyPr>
-          <a:lstStyle/>
-          <a:p>
-            <a:r>
-              <a:rPr lang="en-GB" dirty="0" smtClean="0"/>
-              <a:t>Platform: Mobile and Tablet</a:t>
-            </a:r>
-          </a:p>
-          <a:p>
-            <a:r>
-              <a:rPr lang="en-GB" dirty="0" smtClean="0"/>
-              <a:t>Genre: Puzzle</a:t>
-            </a:r>
-          </a:p>
-          <a:p>
-            <a:r>
-              <a:rPr lang="en-GB" dirty="0" smtClean="0"/>
-              <a:t>Duration: Up to 2 minutes</a:t>
-            </a:r>
-          </a:p>
-          <a:p>
-            <a:endParaRPr lang="en-GB" dirty="0" smtClean="0"/>
-          </a:p>
-          <a:p>
-            <a:endParaRPr lang="en-GB" dirty="0" smtClean="0"/>
-          </a:p>
-          <a:p>
-            <a:endParaRPr lang="en-GB" dirty="0" smtClean="0"/>
-          </a:p>
-          <a:p>
-            <a:endParaRPr lang="en-GB" dirty="0" smtClean="0"/>
-          </a:p>
-          <a:p>
-            <a:pPr>
-              <a:buNone/>
-            </a:pPr>
-            <a:endParaRPr lang="en-GB" sz="700" dirty="0" smtClean="0"/>
-          </a:p>
-          <a:p>
-            <a:pPr>
-              <a:buNone/>
-            </a:pPr>
-            <a:endParaRPr lang="en-GB" sz="700" dirty="0" smtClean="0"/>
-          </a:p>
-          <a:p>
-            <a:pPr>
-              <a:buNone/>
-            </a:pPr>
-            <a:endParaRPr lang="en-GB" sz="700" dirty="0" smtClean="0"/>
-          </a:p>
-          <a:p>
-            <a:pPr>
-              <a:buNone/>
-            </a:pPr>
-            <a:endParaRPr lang="en-GB" sz="700" dirty="0" smtClean="0"/>
-          </a:p>
-          <a:p>
-            <a:pPr>
-              <a:buNone/>
-            </a:pPr>
-            <a:r>
-              <a:rPr lang="en-GB" sz="700" dirty="0" smtClean="0"/>
-              <a:t>Source: http://www.realitymine.com/myth-busting-mobile-gaming-demographics/</a:t>
-            </a:r>
-          </a:p>
-        </p:txBody>
-      </p:sp>
-      <p:pic>
-        <p:nvPicPr>
-          <p:cNvPr id="23554" name="Picture 2" descr="Mobile gaming:Daily playing patterns"/>
-          <p:cNvPicPr>
-            <a:picLocks noChangeAspect="1" noChangeArrowheads="1"/>
-          </p:cNvPicPr>
-          <p:nvPr/>
-        </p:nvPicPr>
-        <p:blipFill>
-          <a:blip r:embed="rId2" cstate="print"/>
-          <a:srcRect/>
-          <a:stretch>
-            <a:fillRect/>
-          </a:stretch>
-        </p:blipFill>
-        <p:spPr bwMode="auto">
-          <a:xfrm>
-            <a:off x="1835696" y="3501008"/>
-            <a:ext cx="5760640" cy="2647532"/>
-          </a:xfrm>
-          <a:prstGeom prst="rect">
-            <a:avLst/>
-          </a:prstGeom>
-          <a:noFill/>
-        </p:spPr>
-      </p:pic>
-    </p:spTree>
-  </p:cSld>
-  <p:clrMapOvr>
-    <a:masterClrMapping/>
-  </p:clrMapOvr>
-</p:sld>
-</file>
-
-<file path=ppt/slides/slide9.xml><?xml version="1.0" encoding="utf-8"?>
-<p:sld xmlns:a="http://schemas.openxmlformats.org/drawingml/2006/main" xmlns:r="http://schemas.openxmlformats.org/officeDocument/2006/relationships" xmlns:p="http://schemas.openxmlformats.org/presentationml/2006/main">
-  <p:cSld>
-    <p:spTree>
-      <p:nvGrpSpPr>
-        <p:cNvPr id="1" name=""/>
-        <p:cNvGrpSpPr/>
-        <p:nvPr/>
-      </p:nvGrpSpPr>
-      <p:grpSpPr>
-        <a:xfrm>
-          <a:off x="0" y="0"/>
-          <a:ext cx="0" cy="0"/>
-          <a:chOff x="0" y="0"/>
-          <a:chExt cx="0" cy="0"/>
-        </a:xfrm>
-      </p:grpSpPr>
-      <p:sp>
-        <p:nvSpPr>
-          <p:cNvPr id="2" name="Title 1"/>
-          <p:cNvSpPr>
-            <a:spLocks noGrp="1"/>
-          </p:cNvSpPr>
-          <p:nvPr>
-            <p:ph type="title"/>
-          </p:nvPr>
-        </p:nvSpPr>
-        <p:spPr/>
-        <p:txBody>
-          <a:bodyPr/>
-          <a:lstStyle/>
-          <a:p>
-            <a:r>
-              <a:rPr lang="en-GB" dirty="0" smtClean="0"/>
               <a:t>Idea 2 – Game Loop</a:t>
             </a:r>
             <a:endParaRPr lang="en-GB" dirty="0"/>
@@ -5460,13 +3742,8 @@
           <a:p>
             <a:r>
               <a:rPr lang="en-GB" dirty="0" smtClean="0"/>
-              <a:t>Direct character through level to </a:t>
-            </a:r>
-            <a:r>
-              <a:rPr lang="en-GB" dirty="0" smtClean="0"/>
-              <a:t>the goal</a:t>
-            </a:r>
-            <a:endParaRPr lang="en-GB" dirty="0" smtClean="0"/>
+              <a:t>Direct character through level to the goal</a:t>
+            </a:r>
           </a:p>
           <a:p>
             <a:r>
@@ -5671,6 +3948,1898 @@
           <a:xfrm>
             <a:off x="4355976" y="1124744"/>
             <a:ext cx="4526880" cy="3292276"/>
+          </a:xfrm>
+          <a:prstGeom prst="rect">
+            <a:avLst/>
+          </a:prstGeom>
+          <a:noFill/>
+        </p:spPr>
+      </p:pic>
+    </p:spTree>
+  </p:cSld>
+  <p:clrMapOvr>
+    <a:masterClrMapping/>
+  </p:clrMapOvr>
+</p:sld>
+</file>
+
+<file path=ppt/slides/slide11.xml><?xml version="1.0" encoding="utf-8"?>
+<p:sld xmlns:a="http://schemas.openxmlformats.org/drawingml/2006/main" xmlns:r="http://schemas.openxmlformats.org/officeDocument/2006/relationships" xmlns:p="http://schemas.openxmlformats.org/presentationml/2006/main">
+  <p:cSld>
+    <p:spTree>
+      <p:nvGrpSpPr>
+        <p:cNvPr id="1" name=""/>
+        <p:cNvGrpSpPr/>
+        <p:nvPr/>
+      </p:nvGrpSpPr>
+      <p:grpSpPr>
+        <a:xfrm>
+          <a:off x="0" y="0"/>
+          <a:ext cx="0" cy="0"/>
+          <a:chOff x="0" y="0"/>
+          <a:chExt cx="0" cy="0"/>
+        </a:xfrm>
+      </p:grpSpPr>
+      <p:sp>
+        <p:nvSpPr>
+          <p:cNvPr id="2" name="Title 1"/>
+          <p:cNvSpPr>
+            <a:spLocks noGrp="1"/>
+          </p:cNvSpPr>
+          <p:nvPr>
+            <p:ph type="title"/>
+          </p:nvPr>
+        </p:nvSpPr>
+        <p:spPr/>
+        <p:txBody>
+          <a:bodyPr/>
+          <a:lstStyle/>
+          <a:p>
+            <a:r>
+              <a:rPr lang="en-GB" dirty="0" smtClean="0"/>
+              <a:t>Idea 2 - Challenges </a:t>
+            </a:r>
+            <a:endParaRPr lang="en-GB" dirty="0"/>
+          </a:p>
+        </p:txBody>
+      </p:sp>
+      <p:sp>
+        <p:nvSpPr>
+          <p:cNvPr id="3" name="Content Placeholder 2"/>
+          <p:cNvSpPr>
+            <a:spLocks noGrp="1"/>
+          </p:cNvSpPr>
+          <p:nvPr>
+            <p:ph idx="1"/>
+          </p:nvPr>
+        </p:nvSpPr>
+        <p:spPr/>
+        <p:txBody>
+          <a:bodyPr/>
+          <a:lstStyle/>
+          <a:p>
+            <a:r>
+              <a:rPr lang="en-GB" dirty="0" smtClean="0"/>
+              <a:t>Directing characters to matching goal platform</a:t>
+            </a:r>
+          </a:p>
+          <a:p>
+            <a:r>
+              <a:rPr lang="en-GB" dirty="0" smtClean="0"/>
+              <a:t>Multiple characters to direct</a:t>
+            </a:r>
+          </a:p>
+          <a:p>
+            <a:r>
+              <a:rPr lang="en-GB" dirty="0" smtClean="0"/>
+              <a:t>Varying Speed</a:t>
+            </a:r>
+          </a:p>
+          <a:p>
+            <a:r>
+              <a:rPr lang="en-GB" dirty="0" smtClean="0"/>
+              <a:t>Level Complexity</a:t>
+            </a:r>
+          </a:p>
+          <a:p>
+            <a:r>
+              <a:rPr lang="en-GB" dirty="0" smtClean="0"/>
+              <a:t>Varying Platforms</a:t>
+            </a:r>
+          </a:p>
+          <a:p>
+            <a:pPr>
+              <a:buNone/>
+            </a:pPr>
+            <a:endParaRPr lang="en-GB" dirty="0"/>
+          </a:p>
+        </p:txBody>
+      </p:sp>
+    </p:spTree>
+  </p:cSld>
+  <p:clrMapOvr>
+    <a:masterClrMapping/>
+  </p:clrMapOvr>
+</p:sld>
+</file>
+
+<file path=ppt/slides/slide12.xml><?xml version="1.0" encoding="utf-8"?>
+<p:sld xmlns:a="http://schemas.openxmlformats.org/drawingml/2006/main" xmlns:r="http://schemas.openxmlformats.org/officeDocument/2006/relationships" xmlns:p="http://schemas.openxmlformats.org/presentationml/2006/main">
+  <p:cSld>
+    <p:spTree>
+      <p:nvGrpSpPr>
+        <p:cNvPr id="1" name=""/>
+        <p:cNvGrpSpPr/>
+        <p:nvPr/>
+      </p:nvGrpSpPr>
+      <p:grpSpPr>
+        <a:xfrm>
+          <a:off x="0" y="0"/>
+          <a:ext cx="0" cy="0"/>
+          <a:chOff x="0" y="0"/>
+          <a:chExt cx="0" cy="0"/>
+        </a:xfrm>
+      </p:grpSpPr>
+      <p:sp>
+        <p:nvSpPr>
+          <p:cNvPr id="2" name="Title 1"/>
+          <p:cNvSpPr>
+            <a:spLocks noGrp="1"/>
+          </p:cNvSpPr>
+          <p:nvPr>
+            <p:ph type="title"/>
+          </p:nvPr>
+        </p:nvSpPr>
+        <p:spPr/>
+        <p:txBody>
+          <a:bodyPr/>
+          <a:lstStyle/>
+          <a:p>
+            <a:r>
+              <a:rPr lang="en-GB" dirty="0" smtClean="0"/>
+              <a:t>Idea 2 – Moodboards and Style Guide</a:t>
+            </a:r>
+            <a:endParaRPr lang="en-GB" dirty="0"/>
+          </a:p>
+        </p:txBody>
+      </p:sp>
+      <p:sp>
+        <p:nvSpPr>
+          <p:cNvPr id="3" name="Content Placeholder 2"/>
+          <p:cNvSpPr>
+            <a:spLocks noGrp="1"/>
+          </p:cNvSpPr>
+          <p:nvPr>
+            <p:ph idx="1"/>
+          </p:nvPr>
+        </p:nvSpPr>
+        <p:spPr/>
+        <p:txBody>
+          <a:bodyPr/>
+          <a:lstStyle/>
+          <a:p>
+            <a:endParaRPr lang="en-GB"/>
+          </a:p>
+        </p:txBody>
+      </p:sp>
+    </p:spTree>
+  </p:cSld>
+  <p:clrMapOvr>
+    <a:masterClrMapping/>
+  </p:clrMapOvr>
+</p:sld>
+</file>
+
+<file path=ppt/slides/slide13.xml><?xml version="1.0" encoding="utf-8"?>
+<p:sld xmlns:a="http://schemas.openxmlformats.org/drawingml/2006/main" xmlns:r="http://schemas.openxmlformats.org/officeDocument/2006/relationships" xmlns:p="http://schemas.openxmlformats.org/presentationml/2006/main">
+  <p:cSld>
+    <p:spTree>
+      <p:nvGrpSpPr>
+        <p:cNvPr id="1" name=""/>
+        <p:cNvGrpSpPr/>
+        <p:nvPr/>
+      </p:nvGrpSpPr>
+      <p:grpSpPr>
+        <a:xfrm>
+          <a:off x="0" y="0"/>
+          <a:ext cx="0" cy="0"/>
+          <a:chOff x="0" y="0"/>
+          <a:chExt cx="0" cy="0"/>
+        </a:xfrm>
+      </p:grpSpPr>
+      <p:sp>
+        <p:nvSpPr>
+          <p:cNvPr id="2" name="Title 1"/>
+          <p:cNvSpPr>
+            <a:spLocks noGrp="1"/>
+          </p:cNvSpPr>
+          <p:nvPr>
+            <p:ph type="title"/>
+          </p:nvPr>
+        </p:nvSpPr>
+        <p:spPr/>
+        <p:txBody>
+          <a:bodyPr/>
+          <a:lstStyle/>
+          <a:p>
+            <a:r>
+              <a:rPr lang="en-GB"/>
+              <a:t>Idea </a:t>
+            </a:r>
+            <a:r>
+              <a:rPr lang="en-GB" smtClean="0"/>
+              <a:t>3- </a:t>
+            </a:r>
+            <a:r>
+              <a:rPr lang="en-GB" dirty="0" smtClean="0"/>
+              <a:t>Game?</a:t>
+            </a:r>
+            <a:endParaRPr lang="en-GB" dirty="0"/>
+          </a:p>
+        </p:txBody>
+      </p:sp>
+      <p:sp>
+        <p:nvSpPr>
+          <p:cNvPr id="3" name="Content Placeholder 2"/>
+          <p:cNvSpPr>
+            <a:spLocks noGrp="1"/>
+          </p:cNvSpPr>
+          <p:nvPr>
+            <p:ph idx="1"/>
+          </p:nvPr>
+        </p:nvSpPr>
+        <p:spPr/>
+        <p:txBody>
+          <a:bodyPr/>
+          <a:lstStyle/>
+          <a:p>
+            <a:endParaRPr lang="en-GB"/>
+          </a:p>
+        </p:txBody>
+      </p:sp>
+    </p:spTree>
+    <p:extLst>
+      <p:ext uri="{BB962C8B-B14F-4D97-AF65-F5344CB8AC3E}">
+        <p14:creationId xmlns:p14="http://schemas.microsoft.com/office/powerpoint/2010/main" xmlns="" val="650876939"/>
+      </p:ext>
+    </p:extLst>
+  </p:cSld>
+  <p:clrMapOvr>
+    <a:masterClrMapping/>
+  </p:clrMapOvr>
+</p:sld>
+</file>
+
+<file path=ppt/slides/slide14.xml><?xml version="1.0" encoding="utf-8"?>
+<p:sld xmlns:a="http://schemas.openxmlformats.org/drawingml/2006/main" xmlns:r="http://schemas.openxmlformats.org/officeDocument/2006/relationships" xmlns:p="http://schemas.openxmlformats.org/presentationml/2006/main">
+  <p:cSld>
+    <p:spTree>
+      <p:nvGrpSpPr>
+        <p:cNvPr id="1" name=""/>
+        <p:cNvGrpSpPr/>
+        <p:nvPr/>
+      </p:nvGrpSpPr>
+      <p:grpSpPr>
+        <a:xfrm>
+          <a:off x="0" y="0"/>
+          <a:ext cx="0" cy="0"/>
+          <a:chOff x="0" y="0"/>
+          <a:chExt cx="0" cy="0"/>
+        </a:xfrm>
+      </p:grpSpPr>
+      <p:sp>
+        <p:nvSpPr>
+          <p:cNvPr id="2" name="Title 1"/>
+          <p:cNvSpPr>
+            <a:spLocks noGrp="1"/>
+          </p:cNvSpPr>
+          <p:nvPr>
+            <p:ph type="title"/>
+          </p:nvPr>
+        </p:nvSpPr>
+        <p:spPr/>
+        <p:txBody>
+          <a:bodyPr/>
+          <a:lstStyle/>
+          <a:p>
+            <a:r>
+              <a:rPr lang="en-GB" dirty="0" smtClean="0"/>
+              <a:t>Idea </a:t>
+            </a:r>
+            <a:r>
+              <a:rPr lang="en-GB" dirty="0"/>
+              <a:t>3- Demographic</a:t>
+            </a:r>
+          </a:p>
+        </p:txBody>
+      </p:sp>
+      <p:sp>
+        <p:nvSpPr>
+          <p:cNvPr id="3" name="Content Placeholder 2"/>
+          <p:cNvSpPr>
+            <a:spLocks noGrp="1"/>
+          </p:cNvSpPr>
+          <p:nvPr>
+            <p:ph idx="1"/>
+          </p:nvPr>
+        </p:nvSpPr>
+        <p:spPr/>
+        <p:txBody>
+          <a:bodyPr/>
+          <a:lstStyle/>
+          <a:p>
+            <a:r>
+              <a:rPr lang="en-GB" dirty="0"/>
+              <a:t>Age: 25-34</a:t>
+            </a:r>
+          </a:p>
+          <a:p>
+            <a:r>
+              <a:rPr lang="en-GB" dirty="0"/>
+              <a:t>Gender: Female</a:t>
+            </a:r>
+          </a:p>
+          <a:p>
+            <a:r>
+              <a:rPr lang="en-GB" dirty="0" smtClean="0"/>
+              <a:t>Hard Fun:</a:t>
+            </a:r>
+            <a:endParaRPr lang="en-GB" dirty="0"/>
+          </a:p>
+        </p:txBody>
+      </p:sp>
+    </p:spTree>
+  </p:cSld>
+  <p:clrMapOvr>
+    <a:masterClrMapping/>
+  </p:clrMapOvr>
+</p:sld>
+</file>
+
+<file path=ppt/slides/slide15.xml><?xml version="1.0" encoding="utf-8"?>
+<p:sld xmlns:a="http://schemas.openxmlformats.org/drawingml/2006/main" xmlns:r="http://schemas.openxmlformats.org/officeDocument/2006/relationships" xmlns:p="http://schemas.openxmlformats.org/presentationml/2006/main">
+  <p:cSld>
+    <p:spTree>
+      <p:nvGrpSpPr>
+        <p:cNvPr id="1" name=""/>
+        <p:cNvGrpSpPr/>
+        <p:nvPr/>
+      </p:nvGrpSpPr>
+      <p:grpSpPr>
+        <a:xfrm>
+          <a:off x="0" y="0"/>
+          <a:ext cx="0" cy="0"/>
+          <a:chOff x="0" y="0"/>
+          <a:chExt cx="0" cy="0"/>
+        </a:xfrm>
+      </p:grpSpPr>
+      <p:sp>
+        <p:nvSpPr>
+          <p:cNvPr id="2" name="Title 1"/>
+          <p:cNvSpPr>
+            <a:spLocks noGrp="1"/>
+          </p:cNvSpPr>
+          <p:nvPr>
+            <p:ph type="title"/>
+          </p:nvPr>
+        </p:nvSpPr>
+        <p:spPr/>
+        <p:txBody>
+          <a:bodyPr/>
+          <a:lstStyle/>
+          <a:p>
+            <a:r>
+              <a:rPr lang="en-GB" dirty="0"/>
+              <a:t>Idea 3- </a:t>
+            </a:r>
+            <a:r>
+              <a:rPr lang="en-GB" dirty="0" smtClean="0"/>
+              <a:t>Platform </a:t>
+            </a:r>
+            <a:r>
+              <a:rPr lang="en-GB" dirty="0"/>
+              <a:t>and Genre</a:t>
+            </a:r>
+          </a:p>
+        </p:txBody>
+      </p:sp>
+      <p:sp>
+        <p:nvSpPr>
+          <p:cNvPr id="3" name="Content Placeholder 2"/>
+          <p:cNvSpPr>
+            <a:spLocks noGrp="1"/>
+          </p:cNvSpPr>
+          <p:nvPr>
+            <p:ph idx="1"/>
+          </p:nvPr>
+        </p:nvSpPr>
+        <p:spPr/>
+        <p:txBody>
+          <a:bodyPr/>
+          <a:lstStyle/>
+          <a:p>
+            <a:r>
+              <a:rPr lang="en-GB" dirty="0"/>
+              <a:t>Platform: Mobile and Tablet</a:t>
+            </a:r>
+          </a:p>
+          <a:p>
+            <a:r>
+              <a:rPr lang="en-GB" dirty="0"/>
+              <a:t>Genre: Puzzle</a:t>
+            </a:r>
+          </a:p>
+          <a:p>
+            <a:r>
+              <a:rPr lang="en-GB" dirty="0"/>
+              <a:t>Duration: 1</a:t>
+            </a:r>
+            <a:r>
+              <a:rPr lang="en-GB" dirty="0" smtClean="0"/>
+              <a:t> minutes per life with up to 6 mins of play when all lives are used at once</a:t>
+            </a:r>
+            <a:endParaRPr lang="en-GB" dirty="0"/>
+          </a:p>
+          <a:p>
+            <a:endParaRPr lang="en-GB" dirty="0"/>
+          </a:p>
+        </p:txBody>
+      </p:sp>
+    </p:spTree>
+  </p:cSld>
+  <p:clrMapOvr>
+    <a:masterClrMapping/>
+  </p:clrMapOvr>
+</p:sld>
+</file>
+
+<file path=ppt/slides/slide16.xml><?xml version="1.0" encoding="utf-8"?>
+<p:sld xmlns:a="http://schemas.openxmlformats.org/drawingml/2006/main" xmlns:r="http://schemas.openxmlformats.org/officeDocument/2006/relationships" xmlns:p="http://schemas.openxmlformats.org/presentationml/2006/main">
+  <p:cSld>
+    <p:spTree>
+      <p:nvGrpSpPr>
+        <p:cNvPr id="1" name=""/>
+        <p:cNvGrpSpPr/>
+        <p:nvPr/>
+      </p:nvGrpSpPr>
+      <p:grpSpPr>
+        <a:xfrm>
+          <a:off x="0" y="0"/>
+          <a:ext cx="0" cy="0"/>
+          <a:chOff x="0" y="0"/>
+          <a:chExt cx="0" cy="0"/>
+        </a:xfrm>
+      </p:grpSpPr>
+      <p:sp>
+        <p:nvSpPr>
+          <p:cNvPr id="2" name="Title 1"/>
+          <p:cNvSpPr>
+            <a:spLocks noGrp="1"/>
+          </p:cNvSpPr>
+          <p:nvPr>
+            <p:ph type="title"/>
+          </p:nvPr>
+        </p:nvSpPr>
+        <p:spPr/>
+        <p:txBody>
+          <a:bodyPr/>
+          <a:lstStyle/>
+          <a:p>
+            <a:r>
+              <a:rPr lang="en-GB" dirty="0" smtClean="0"/>
+              <a:t>Idea 3- Game </a:t>
+            </a:r>
+            <a:r>
+              <a:rPr lang="en-GB" dirty="0"/>
+              <a:t>Loop</a:t>
+            </a:r>
+          </a:p>
+        </p:txBody>
+      </p:sp>
+      <p:sp>
+        <p:nvSpPr>
+          <p:cNvPr id="3" name="Content Placeholder 2"/>
+          <p:cNvSpPr>
+            <a:spLocks noGrp="1"/>
+          </p:cNvSpPr>
+          <p:nvPr>
+            <p:ph idx="1"/>
+          </p:nvPr>
+        </p:nvSpPr>
+        <p:spPr>
+          <a:xfrm>
+            <a:off x="457200" y="4105374"/>
+            <a:ext cx="8229600" cy="2491978"/>
+          </a:xfrm>
+        </p:spPr>
+        <p:txBody>
+          <a:bodyPr>
+            <a:normAutofit lnSpcReduction="10000"/>
+          </a:bodyPr>
+          <a:lstStyle/>
+          <a:p>
+            <a:r>
+              <a:rPr lang="en-GB" dirty="0" smtClean="0"/>
+              <a:t>Player’s have a minute to come up with as many words as they can using the giving letters</a:t>
+            </a:r>
+          </a:p>
+          <a:p>
+            <a:r>
+              <a:rPr lang="en-GB" dirty="0" smtClean="0"/>
+              <a:t>Soft </a:t>
+            </a:r>
+            <a:r>
+              <a:rPr lang="en-GB" dirty="0"/>
+              <a:t>Currency – Power Ups</a:t>
+            </a:r>
+          </a:p>
+          <a:p>
+            <a:r>
+              <a:rPr lang="en-GB" dirty="0"/>
+              <a:t>Hard Currency </a:t>
+            </a:r>
+            <a:r>
+              <a:rPr lang="en-GB" dirty="0" smtClean="0"/>
+              <a:t>– Refill your lives</a:t>
+            </a:r>
+            <a:endParaRPr lang="en-GB" dirty="0"/>
+          </a:p>
+        </p:txBody>
+      </p:sp>
+      <p:sp>
+        <p:nvSpPr>
+          <p:cNvPr id="4" name="Bent-Up Arrow 3"/>
+          <p:cNvSpPr/>
+          <p:nvPr/>
+        </p:nvSpPr>
+        <p:spPr>
+          <a:xfrm rot="10800000" flipH="1">
+            <a:off x="5076056" y="1761184"/>
+            <a:ext cx="864096" cy="1296144"/>
+          </a:xfrm>
+          <a:prstGeom prst="bentUpArrow">
+            <a:avLst/>
+          </a:prstGeom>
+        </p:spPr>
+        <p:style>
+          <a:lnRef idx="2">
+            <a:schemeClr val="accent1">
+              <a:shade val="50000"/>
+            </a:schemeClr>
+          </a:lnRef>
+          <a:fillRef idx="1">
+            <a:schemeClr val="accent1"/>
+          </a:fillRef>
+          <a:effectRef idx="0">
+            <a:schemeClr val="accent1"/>
+          </a:effectRef>
+          <a:fontRef idx="minor">
+            <a:schemeClr val="lt1"/>
+          </a:fontRef>
+        </p:style>
+        <p:txBody>
+          <a:bodyPr rtlCol="0" anchor="ctr"/>
+          <a:lstStyle/>
+          <a:p>
+            <a:pPr algn="ctr"/>
+            <a:endParaRPr lang="en-GB"/>
+          </a:p>
+        </p:txBody>
+      </p:sp>
+      <p:sp>
+        <p:nvSpPr>
+          <p:cNvPr id="5" name="Bent-Up Arrow 4"/>
+          <p:cNvSpPr/>
+          <p:nvPr/>
+        </p:nvSpPr>
+        <p:spPr>
+          <a:xfrm rot="5400000" flipH="1">
+            <a:off x="2475837" y="1941204"/>
+            <a:ext cx="1368152" cy="864096"/>
+          </a:xfrm>
+          <a:prstGeom prst="bentUpArrow">
+            <a:avLst/>
+          </a:prstGeom>
+        </p:spPr>
+        <p:style>
+          <a:lnRef idx="2">
+            <a:schemeClr val="accent1">
+              <a:shade val="50000"/>
+            </a:schemeClr>
+          </a:lnRef>
+          <a:fillRef idx="1">
+            <a:schemeClr val="accent1"/>
+          </a:fillRef>
+          <a:effectRef idx="0">
+            <a:schemeClr val="accent1"/>
+          </a:effectRef>
+          <a:fontRef idx="minor">
+            <a:schemeClr val="lt1"/>
+          </a:fontRef>
+        </p:style>
+        <p:txBody>
+          <a:bodyPr rtlCol="0" anchor="ctr"/>
+          <a:lstStyle/>
+          <a:p>
+            <a:pPr algn="ctr"/>
+            <a:endParaRPr lang="en-GB"/>
+          </a:p>
+        </p:txBody>
+      </p:sp>
+      <p:sp>
+        <p:nvSpPr>
+          <p:cNvPr id="6" name="Down Arrow 5"/>
+          <p:cNvSpPr/>
+          <p:nvPr/>
+        </p:nvSpPr>
+        <p:spPr>
+          <a:xfrm rot="5400000">
+            <a:off x="3771981" y="2805300"/>
+            <a:ext cx="504056" cy="1152128"/>
+          </a:xfrm>
+          <a:prstGeom prst="downArrow">
+            <a:avLst/>
+          </a:prstGeom>
+        </p:spPr>
+        <p:style>
+          <a:lnRef idx="2">
+            <a:schemeClr val="accent1">
+              <a:shade val="50000"/>
+            </a:schemeClr>
+          </a:lnRef>
+          <a:fillRef idx="1">
+            <a:schemeClr val="accent1"/>
+          </a:fillRef>
+          <a:effectRef idx="0">
+            <a:schemeClr val="accent1"/>
+          </a:effectRef>
+          <a:fontRef idx="minor">
+            <a:schemeClr val="lt1"/>
+          </a:fontRef>
+        </p:style>
+        <p:txBody>
+          <a:bodyPr rtlCol="0" anchor="ctr"/>
+          <a:lstStyle/>
+          <a:p>
+            <a:pPr algn="ctr"/>
+            <a:endParaRPr lang="en-GB"/>
+          </a:p>
+        </p:txBody>
+      </p:sp>
+      <p:sp>
+        <p:nvSpPr>
+          <p:cNvPr id="10" name="TextBox 9"/>
+          <p:cNvSpPr txBox="1"/>
+          <p:nvPr/>
+        </p:nvSpPr>
+        <p:spPr>
+          <a:xfrm>
+            <a:off x="3613929" y="1689176"/>
+            <a:ext cx="1368152" cy="369332"/>
+          </a:xfrm>
+          <a:prstGeom prst="rect">
+            <a:avLst/>
+          </a:prstGeom>
+          <a:noFill/>
+        </p:spPr>
+        <p:txBody>
+          <a:bodyPr wrap="square" rtlCol="0">
+            <a:spAutoFit/>
+          </a:bodyPr>
+          <a:lstStyle/>
+          <a:p>
+            <a:r>
+              <a:rPr lang="en-GB" dirty="0" smtClean="0"/>
+              <a:t>Use a Life</a:t>
+            </a:r>
+            <a:endParaRPr lang="en-GB" dirty="0"/>
+          </a:p>
+        </p:txBody>
+      </p:sp>
+      <p:sp>
+        <p:nvSpPr>
+          <p:cNvPr id="11" name="TextBox 10"/>
+          <p:cNvSpPr txBox="1"/>
+          <p:nvPr/>
+        </p:nvSpPr>
+        <p:spPr>
+          <a:xfrm>
+            <a:off x="2367825" y="3007413"/>
+            <a:ext cx="1152128" cy="646331"/>
+          </a:xfrm>
+          <a:prstGeom prst="rect">
+            <a:avLst/>
+          </a:prstGeom>
+          <a:noFill/>
+        </p:spPr>
+        <p:txBody>
+          <a:bodyPr wrap="square" rtlCol="0">
+            <a:spAutoFit/>
+          </a:bodyPr>
+          <a:lstStyle/>
+          <a:p>
+            <a:r>
+              <a:rPr lang="en-GB" dirty="0" smtClean="0"/>
+              <a:t>Earn rewards</a:t>
+            </a:r>
+            <a:endParaRPr lang="en-GB" dirty="0"/>
+          </a:p>
+        </p:txBody>
+      </p:sp>
+      <p:sp>
+        <p:nvSpPr>
+          <p:cNvPr id="12" name="TextBox 11"/>
+          <p:cNvSpPr txBox="1"/>
+          <p:nvPr/>
+        </p:nvSpPr>
+        <p:spPr>
+          <a:xfrm>
+            <a:off x="4600073" y="2949987"/>
+            <a:ext cx="2448272" cy="923330"/>
+          </a:xfrm>
+          <a:prstGeom prst="rect">
+            <a:avLst/>
+          </a:prstGeom>
+          <a:noFill/>
+        </p:spPr>
+        <p:txBody>
+          <a:bodyPr wrap="square" rtlCol="0">
+            <a:spAutoFit/>
+          </a:bodyPr>
+          <a:lstStyle/>
+          <a:p>
+            <a:r>
+              <a:rPr lang="en-GB" dirty="0" smtClean="0"/>
+              <a:t>Make as many words as you can in a minute</a:t>
+            </a:r>
+            <a:endParaRPr lang="en-GB" dirty="0"/>
+          </a:p>
+        </p:txBody>
+      </p:sp>
+    </p:spTree>
+  </p:cSld>
+  <p:clrMapOvr>
+    <a:masterClrMapping/>
+  </p:clrMapOvr>
+</p:sld>
+</file>
+
+<file path=ppt/slides/slide17.xml><?xml version="1.0" encoding="utf-8"?>
+<p:sld xmlns:a="http://schemas.openxmlformats.org/drawingml/2006/main" xmlns:r="http://schemas.openxmlformats.org/officeDocument/2006/relationships" xmlns:p="http://schemas.openxmlformats.org/presentationml/2006/main">
+  <p:cSld>
+    <p:spTree>
+      <p:nvGrpSpPr>
+        <p:cNvPr id="1" name=""/>
+        <p:cNvGrpSpPr/>
+        <p:nvPr/>
+      </p:nvGrpSpPr>
+      <p:grpSpPr>
+        <a:xfrm>
+          <a:off x="0" y="0"/>
+          <a:ext cx="0" cy="0"/>
+          <a:chOff x="0" y="0"/>
+          <a:chExt cx="0" cy="0"/>
+        </a:xfrm>
+      </p:grpSpPr>
+      <p:sp>
+        <p:nvSpPr>
+          <p:cNvPr id="2" name="Title 1"/>
+          <p:cNvSpPr>
+            <a:spLocks noGrp="1"/>
+          </p:cNvSpPr>
+          <p:nvPr>
+            <p:ph type="title"/>
+          </p:nvPr>
+        </p:nvSpPr>
+        <p:spPr/>
+        <p:txBody>
+          <a:bodyPr/>
+          <a:lstStyle/>
+          <a:p>
+            <a:r>
+              <a:rPr lang="en-GB" dirty="0"/>
+              <a:t>Idea </a:t>
+            </a:r>
+            <a:r>
+              <a:rPr lang="en-GB" dirty="0" smtClean="0"/>
+              <a:t>3 </a:t>
+            </a:r>
+            <a:r>
+              <a:rPr lang="en-GB" dirty="0"/>
+              <a:t>- Challenges</a:t>
+            </a:r>
+          </a:p>
+        </p:txBody>
+      </p:sp>
+      <p:sp>
+        <p:nvSpPr>
+          <p:cNvPr id="3" name="Content Placeholder 2"/>
+          <p:cNvSpPr>
+            <a:spLocks noGrp="1"/>
+          </p:cNvSpPr>
+          <p:nvPr>
+            <p:ph idx="1"/>
+          </p:nvPr>
+        </p:nvSpPr>
+        <p:spPr/>
+        <p:txBody>
+          <a:bodyPr/>
+          <a:lstStyle/>
+          <a:p>
+            <a:r>
+              <a:rPr lang="en-GB" dirty="0" smtClean="0"/>
+              <a:t>Fast paced</a:t>
+            </a:r>
+          </a:p>
+          <a:p>
+            <a:r>
+              <a:rPr lang="en-GB" dirty="0" smtClean="0"/>
+              <a:t>Mental challenge</a:t>
+            </a:r>
+          </a:p>
+          <a:p>
+            <a:r>
+              <a:rPr lang="en-GB" dirty="0" smtClean="0"/>
+              <a:t>Varying amount of letters</a:t>
+            </a:r>
+          </a:p>
+          <a:p>
+            <a:endParaRPr lang="en-GB" dirty="0" smtClean="0"/>
+          </a:p>
+          <a:p>
+            <a:endParaRPr lang="en-GB" dirty="0" smtClean="0"/>
+          </a:p>
+        </p:txBody>
+      </p:sp>
+    </p:spTree>
+  </p:cSld>
+  <p:clrMapOvr>
+    <a:masterClrMapping/>
+  </p:clrMapOvr>
+</p:sld>
+</file>
+
+<file path=ppt/slides/slide18.xml><?xml version="1.0" encoding="utf-8"?>
+<p:sld xmlns:a="http://schemas.openxmlformats.org/drawingml/2006/main" xmlns:r="http://schemas.openxmlformats.org/officeDocument/2006/relationships" xmlns:p="http://schemas.openxmlformats.org/presentationml/2006/main">
+  <p:cSld>
+    <p:spTree>
+      <p:nvGrpSpPr>
+        <p:cNvPr id="1" name=""/>
+        <p:cNvGrpSpPr/>
+        <p:nvPr/>
+      </p:nvGrpSpPr>
+      <p:grpSpPr>
+        <a:xfrm>
+          <a:off x="0" y="0"/>
+          <a:ext cx="0" cy="0"/>
+          <a:chOff x="0" y="0"/>
+          <a:chExt cx="0" cy="0"/>
+        </a:xfrm>
+      </p:grpSpPr>
+      <p:sp>
+        <p:nvSpPr>
+          <p:cNvPr id="2" name="Title 1"/>
+          <p:cNvSpPr>
+            <a:spLocks noGrp="1"/>
+          </p:cNvSpPr>
+          <p:nvPr>
+            <p:ph type="title"/>
+          </p:nvPr>
+        </p:nvSpPr>
+        <p:spPr/>
+        <p:txBody>
+          <a:bodyPr/>
+          <a:lstStyle/>
+          <a:p>
+            <a:r>
+              <a:rPr lang="en-GB" dirty="0"/>
+              <a:t>Idea </a:t>
+            </a:r>
+            <a:r>
+              <a:rPr lang="en-GB" dirty="0" smtClean="0"/>
+              <a:t>3 </a:t>
+            </a:r>
+            <a:r>
+              <a:rPr lang="en-GB" dirty="0"/>
+              <a:t>– </a:t>
+            </a:r>
+            <a:r>
+              <a:rPr lang="en-GB" dirty="0" err="1"/>
+              <a:t>Moodboards</a:t>
+            </a:r>
+            <a:r>
+              <a:rPr lang="en-GB" dirty="0"/>
+              <a:t> and Style Guide</a:t>
+            </a:r>
+          </a:p>
+        </p:txBody>
+      </p:sp>
+      <p:sp>
+        <p:nvSpPr>
+          <p:cNvPr id="3" name="Content Placeholder 2"/>
+          <p:cNvSpPr>
+            <a:spLocks noGrp="1"/>
+          </p:cNvSpPr>
+          <p:nvPr>
+            <p:ph idx="1"/>
+          </p:nvPr>
+        </p:nvSpPr>
+        <p:spPr/>
+        <p:txBody>
+          <a:bodyPr/>
+          <a:lstStyle/>
+          <a:p>
+            <a:endParaRPr lang="en-GB" dirty="0"/>
+          </a:p>
+        </p:txBody>
+      </p:sp>
+    </p:spTree>
+  </p:cSld>
+  <p:clrMapOvr>
+    <a:masterClrMapping/>
+  </p:clrMapOvr>
+</p:sld>
+</file>
+
+<file path=ppt/slides/slide19.xml><?xml version="1.0" encoding="utf-8"?>
+<p:sld xmlns:a="http://schemas.openxmlformats.org/drawingml/2006/main" xmlns:r="http://schemas.openxmlformats.org/officeDocument/2006/relationships" xmlns:p="http://schemas.openxmlformats.org/presentationml/2006/main">
+  <p:cSld>
+    <p:spTree>
+      <p:nvGrpSpPr>
+        <p:cNvPr id="1" name=""/>
+        <p:cNvGrpSpPr/>
+        <p:nvPr/>
+      </p:nvGrpSpPr>
+      <p:grpSpPr>
+        <a:xfrm>
+          <a:off x="0" y="0"/>
+          <a:ext cx="0" cy="0"/>
+          <a:chOff x="0" y="0"/>
+          <a:chExt cx="0" cy="0"/>
+        </a:xfrm>
+      </p:grpSpPr>
+      <p:sp>
+        <p:nvSpPr>
+          <p:cNvPr id="2" name="Title 1"/>
+          <p:cNvSpPr>
+            <a:spLocks noGrp="1"/>
+          </p:cNvSpPr>
+          <p:nvPr>
+            <p:ph type="title"/>
+          </p:nvPr>
+        </p:nvSpPr>
+        <p:spPr>
+          <a:xfrm>
+            <a:off x="467544" y="2780928"/>
+            <a:ext cx="8229600" cy="1399032"/>
+          </a:xfrm>
+        </p:spPr>
+        <p:txBody>
+          <a:bodyPr/>
+          <a:lstStyle/>
+          <a:p>
+            <a:r>
+              <a:rPr lang="en-GB" dirty="0" smtClean="0">
+                <a:effectLst>
+                  <a:outerShdw blurRad="38100" dist="38100" dir="2700000" algn="tl">
+                    <a:srgbClr val="000000">
+                      <a:alpha val="43137"/>
+                    </a:srgbClr>
+                  </a:outerShdw>
+                </a:effectLst>
+              </a:rPr>
+              <a:t>Questions?</a:t>
+            </a:r>
+            <a:endParaRPr lang="en-GB" dirty="0">
+              <a:effectLst>
+                <a:outerShdw blurRad="38100" dist="38100" dir="2700000" algn="tl">
+                  <a:srgbClr val="000000">
+                    <a:alpha val="43137"/>
+                  </a:srgbClr>
+                </a:outerShdw>
+              </a:effectLst>
+            </a:endParaRPr>
+          </a:p>
+        </p:txBody>
+      </p:sp>
+    </p:spTree>
+    <p:extLst>
+      <p:ext uri="{BB962C8B-B14F-4D97-AF65-F5344CB8AC3E}">
+        <p14:creationId xmlns:p14="http://schemas.microsoft.com/office/powerpoint/2010/main" xmlns="" val="3579189080"/>
+      </p:ext>
+    </p:extLst>
+  </p:cSld>
+  <p:clrMapOvr>
+    <a:masterClrMapping/>
+  </p:clrMapOvr>
+</p:sld>
+</file>
+
+<file path=ppt/slides/slide2.xml><?xml version="1.0" encoding="utf-8"?>
+<p:sld xmlns:a="http://schemas.openxmlformats.org/drawingml/2006/main" xmlns:r="http://schemas.openxmlformats.org/officeDocument/2006/relationships" xmlns:p="http://schemas.openxmlformats.org/presentationml/2006/main">
+  <p:cSld>
+    <p:spTree>
+      <p:nvGrpSpPr>
+        <p:cNvPr id="1" name=""/>
+        <p:cNvGrpSpPr/>
+        <p:nvPr/>
+      </p:nvGrpSpPr>
+      <p:grpSpPr>
+        <a:xfrm>
+          <a:off x="0" y="0"/>
+          <a:ext cx="0" cy="0"/>
+          <a:chOff x="0" y="0"/>
+          <a:chExt cx="0" cy="0"/>
+        </a:xfrm>
+      </p:grpSpPr>
+      <p:sp>
+        <p:nvSpPr>
+          <p:cNvPr id="2" name="Title 1"/>
+          <p:cNvSpPr>
+            <a:spLocks noGrp="1"/>
+          </p:cNvSpPr>
+          <p:nvPr>
+            <p:ph type="title"/>
+          </p:nvPr>
+        </p:nvSpPr>
+        <p:spPr/>
+        <p:txBody>
+          <a:bodyPr/>
+          <a:lstStyle/>
+          <a:p>
+            <a:r>
+              <a:rPr lang="en-GB" dirty="0" smtClean="0"/>
+              <a:t>Idea 1- </a:t>
+            </a:r>
+            <a:r>
+              <a:rPr lang="en-GB" dirty="0" smtClean="0"/>
+              <a:t>Hex Switching</a:t>
+            </a:r>
+            <a:endParaRPr lang="en-GB" dirty="0"/>
+          </a:p>
+        </p:txBody>
+      </p:sp>
+      <p:sp>
+        <p:nvSpPr>
+          <p:cNvPr id="3" name="Content Placeholder 2"/>
+          <p:cNvSpPr>
+            <a:spLocks noGrp="1"/>
+          </p:cNvSpPr>
+          <p:nvPr>
+            <p:ph idx="1"/>
+          </p:nvPr>
+        </p:nvSpPr>
+        <p:spPr/>
+        <p:txBody>
+          <a:bodyPr/>
+          <a:lstStyle/>
+          <a:p>
+            <a:endParaRPr lang="en-GB" dirty="0"/>
+          </a:p>
+        </p:txBody>
+      </p:sp>
+    </p:spTree>
+  </p:cSld>
+  <p:clrMapOvr>
+    <a:masterClrMapping/>
+  </p:clrMapOvr>
+</p:sld>
+</file>
+
+<file path=ppt/slides/slide20.xml><?xml version="1.0" encoding="utf-8"?>
+<p:sld xmlns:a="http://schemas.openxmlformats.org/drawingml/2006/main" xmlns:r="http://schemas.openxmlformats.org/officeDocument/2006/relationships" xmlns:p="http://schemas.openxmlformats.org/presentationml/2006/main">
+  <p:cSld>
+    <p:spTree>
+      <p:nvGrpSpPr>
+        <p:cNvPr id="1" name=""/>
+        <p:cNvGrpSpPr/>
+        <p:nvPr/>
+      </p:nvGrpSpPr>
+      <p:grpSpPr>
+        <a:xfrm>
+          <a:off x="0" y="0"/>
+          <a:ext cx="0" cy="0"/>
+          <a:chOff x="0" y="0"/>
+          <a:chExt cx="0" cy="0"/>
+        </a:xfrm>
+      </p:grpSpPr>
+      <p:sp>
+        <p:nvSpPr>
+          <p:cNvPr id="2" name="Title 1"/>
+          <p:cNvSpPr>
+            <a:spLocks noGrp="1"/>
+          </p:cNvSpPr>
+          <p:nvPr>
+            <p:ph type="title"/>
+          </p:nvPr>
+        </p:nvSpPr>
+        <p:spPr/>
+        <p:txBody>
+          <a:bodyPr/>
+          <a:lstStyle/>
+          <a:p>
+            <a:endParaRPr lang="en-GB" dirty="0"/>
+          </a:p>
+        </p:txBody>
+      </p:sp>
+      <p:sp>
+        <p:nvSpPr>
+          <p:cNvPr id="3" name="Content Placeholder 2"/>
+          <p:cNvSpPr>
+            <a:spLocks noGrp="1"/>
+          </p:cNvSpPr>
+          <p:nvPr>
+            <p:ph idx="1"/>
+          </p:nvPr>
+        </p:nvSpPr>
+        <p:spPr/>
+        <p:txBody>
+          <a:bodyPr>
+            <a:normAutofit fontScale="92500" lnSpcReduction="20000"/>
+          </a:bodyPr>
+          <a:lstStyle/>
+          <a:p>
+            <a:r>
+              <a:rPr lang="en-GB" dirty="0" smtClean="0">
+                <a:hlinkClick r:id="rId2"/>
+              </a:rPr>
+              <a:t>http://www.ampush.com/blog/the-fastest-growing-mobile-gaming-audience-women/</a:t>
+            </a:r>
+            <a:endParaRPr lang="en-GB" dirty="0" smtClean="0"/>
+          </a:p>
+          <a:p>
+            <a:r>
+              <a:rPr lang="en-GB" dirty="0" smtClean="0">
+                <a:hlinkClick r:id="rId3"/>
+              </a:rPr>
+              <a:t>http://www.realitymine.com/myth-busting-mobile-gaming-demographics/</a:t>
+            </a:r>
+            <a:endParaRPr lang="en-GB" dirty="0" smtClean="0"/>
+          </a:p>
+          <a:p>
+            <a:r>
+              <a:rPr lang="en-GB" dirty="0" smtClean="0">
+                <a:hlinkClick r:id="rId4"/>
+              </a:rPr>
+              <a:t>http://www.adweek.com/brand-marketing/infographic-how-mobile-use-varies-across-generations-166426/</a:t>
+            </a:r>
+            <a:endParaRPr lang="en-GB" dirty="0" smtClean="0"/>
+          </a:p>
+          <a:p>
+            <a:r>
+              <a:rPr lang="en-GB" dirty="0" smtClean="0">
+                <a:hlinkClick r:id="rId5"/>
+              </a:rPr>
+              <a:t>https://www.nyfa.edu/student-resources/learning-from-the-best-puzzle-games/</a:t>
+            </a:r>
+            <a:endParaRPr lang="en-GB" dirty="0" smtClean="0"/>
+          </a:p>
+          <a:p>
+            <a:r>
+              <a:rPr lang="en-GB" dirty="0" smtClean="0">
+                <a:hlinkClick r:id="rId6"/>
+              </a:rPr>
+              <a:t>https://vungle.com/blog/2015/04/27/the-6-rules-of-a-hit-puzzle-game/</a:t>
+            </a:r>
+            <a:endParaRPr lang="en-GB" dirty="0" smtClean="0"/>
+          </a:p>
+          <a:p>
+            <a:endParaRPr lang="en-GB" dirty="0"/>
+          </a:p>
+        </p:txBody>
+      </p:sp>
+    </p:spTree>
+  </p:cSld>
+  <p:clrMapOvr>
+    <a:masterClrMapping/>
+  </p:clrMapOvr>
+</p:sld>
+</file>
+
+<file path=ppt/slides/slide3.xml><?xml version="1.0" encoding="utf-8"?>
+<p:sld xmlns:a="http://schemas.openxmlformats.org/drawingml/2006/main" xmlns:r="http://schemas.openxmlformats.org/officeDocument/2006/relationships" xmlns:p="http://schemas.openxmlformats.org/presentationml/2006/main">
+  <p:cSld>
+    <p:spTree>
+      <p:nvGrpSpPr>
+        <p:cNvPr id="1" name=""/>
+        <p:cNvGrpSpPr/>
+        <p:nvPr/>
+      </p:nvGrpSpPr>
+      <p:grpSpPr>
+        <a:xfrm>
+          <a:off x="0" y="0"/>
+          <a:ext cx="0" cy="0"/>
+          <a:chOff x="0" y="0"/>
+          <a:chExt cx="0" cy="0"/>
+        </a:xfrm>
+      </p:grpSpPr>
+      <p:sp>
+        <p:nvSpPr>
+          <p:cNvPr id="2" name="Title 1"/>
+          <p:cNvSpPr>
+            <a:spLocks noGrp="1"/>
+          </p:cNvSpPr>
+          <p:nvPr>
+            <p:ph type="title"/>
+          </p:nvPr>
+        </p:nvSpPr>
+        <p:spPr/>
+        <p:txBody>
+          <a:bodyPr/>
+          <a:lstStyle/>
+          <a:p>
+            <a:r>
+              <a:rPr lang="en-GB" dirty="0"/>
+              <a:t>Idea 1- </a:t>
+            </a:r>
+            <a:r>
+              <a:rPr lang="en-GB" dirty="0" smtClean="0"/>
+              <a:t>Demographic</a:t>
+            </a:r>
+            <a:endParaRPr lang="en-GB" dirty="0"/>
+          </a:p>
+        </p:txBody>
+      </p:sp>
+      <p:sp>
+        <p:nvSpPr>
+          <p:cNvPr id="3" name="Content Placeholder 2"/>
+          <p:cNvSpPr>
+            <a:spLocks noGrp="1"/>
+          </p:cNvSpPr>
+          <p:nvPr>
+            <p:ph idx="1"/>
+          </p:nvPr>
+        </p:nvSpPr>
+        <p:spPr/>
+        <p:txBody>
+          <a:bodyPr/>
+          <a:lstStyle/>
+          <a:p>
+            <a:endParaRPr lang="en-GB"/>
+          </a:p>
+        </p:txBody>
+      </p:sp>
+    </p:spTree>
+  </p:cSld>
+  <p:clrMapOvr>
+    <a:masterClrMapping/>
+  </p:clrMapOvr>
+</p:sld>
+</file>
+
+<file path=ppt/slides/slide4.xml><?xml version="1.0" encoding="utf-8"?>
+<p:sld xmlns:a="http://schemas.openxmlformats.org/drawingml/2006/main" xmlns:r="http://schemas.openxmlformats.org/officeDocument/2006/relationships" xmlns:p="http://schemas.openxmlformats.org/presentationml/2006/main">
+  <p:cSld>
+    <p:spTree>
+      <p:nvGrpSpPr>
+        <p:cNvPr id="1" name=""/>
+        <p:cNvGrpSpPr/>
+        <p:nvPr/>
+      </p:nvGrpSpPr>
+      <p:grpSpPr>
+        <a:xfrm>
+          <a:off x="0" y="0"/>
+          <a:ext cx="0" cy="0"/>
+          <a:chOff x="0" y="0"/>
+          <a:chExt cx="0" cy="0"/>
+        </a:xfrm>
+      </p:grpSpPr>
+      <p:sp>
+        <p:nvSpPr>
+          <p:cNvPr id="2" name="Title 1"/>
+          <p:cNvSpPr>
+            <a:spLocks noGrp="1"/>
+          </p:cNvSpPr>
+          <p:nvPr>
+            <p:ph type="title"/>
+          </p:nvPr>
+        </p:nvSpPr>
+        <p:spPr/>
+        <p:txBody>
+          <a:bodyPr/>
+          <a:lstStyle/>
+          <a:p>
+            <a:r>
+              <a:rPr lang="en-GB" dirty="0"/>
+              <a:t>Idea 1- </a:t>
+            </a:r>
+            <a:r>
+              <a:rPr lang="en-GB" dirty="0" smtClean="0"/>
+              <a:t>Platform and Genre</a:t>
+            </a:r>
+            <a:endParaRPr lang="en-GB" dirty="0"/>
+          </a:p>
+        </p:txBody>
+      </p:sp>
+      <p:sp>
+        <p:nvSpPr>
+          <p:cNvPr id="3" name="Content Placeholder 2"/>
+          <p:cNvSpPr>
+            <a:spLocks noGrp="1"/>
+          </p:cNvSpPr>
+          <p:nvPr>
+            <p:ph idx="1"/>
+          </p:nvPr>
+        </p:nvSpPr>
+        <p:spPr/>
+        <p:txBody>
+          <a:bodyPr/>
+          <a:lstStyle/>
+          <a:p>
+            <a:endParaRPr lang="en-GB"/>
+          </a:p>
+        </p:txBody>
+      </p:sp>
+    </p:spTree>
+  </p:cSld>
+  <p:clrMapOvr>
+    <a:masterClrMapping/>
+  </p:clrMapOvr>
+</p:sld>
+</file>
+
+<file path=ppt/slides/slide5.xml><?xml version="1.0" encoding="utf-8"?>
+<p:sld xmlns:a="http://schemas.openxmlformats.org/drawingml/2006/main" xmlns:r="http://schemas.openxmlformats.org/officeDocument/2006/relationships" xmlns:p="http://schemas.openxmlformats.org/presentationml/2006/main">
+  <p:cSld>
+    <p:spTree>
+      <p:nvGrpSpPr>
+        <p:cNvPr id="1" name=""/>
+        <p:cNvGrpSpPr/>
+        <p:nvPr/>
+      </p:nvGrpSpPr>
+      <p:grpSpPr>
+        <a:xfrm>
+          <a:off x="0" y="0"/>
+          <a:ext cx="0" cy="0"/>
+          <a:chOff x="0" y="0"/>
+          <a:chExt cx="0" cy="0"/>
+        </a:xfrm>
+      </p:grpSpPr>
+      <p:sp>
+        <p:nvSpPr>
+          <p:cNvPr id="2" name="Title 1"/>
+          <p:cNvSpPr>
+            <a:spLocks noGrp="1"/>
+          </p:cNvSpPr>
+          <p:nvPr>
+            <p:ph type="title"/>
+          </p:nvPr>
+        </p:nvSpPr>
+        <p:spPr/>
+        <p:txBody>
+          <a:bodyPr/>
+          <a:lstStyle/>
+          <a:p>
+            <a:r>
+              <a:rPr lang="en-GB" dirty="0"/>
+              <a:t>Idea 1- </a:t>
+            </a:r>
+            <a:r>
+              <a:rPr lang="en-GB" dirty="0" smtClean="0"/>
+              <a:t>Game Loop</a:t>
+            </a:r>
+            <a:endParaRPr lang="en-GB" dirty="0"/>
+          </a:p>
+        </p:txBody>
+      </p:sp>
+      <p:sp>
+        <p:nvSpPr>
+          <p:cNvPr id="3" name="Content Placeholder 2"/>
+          <p:cNvSpPr>
+            <a:spLocks noGrp="1"/>
+          </p:cNvSpPr>
+          <p:nvPr>
+            <p:ph idx="1"/>
+          </p:nvPr>
+        </p:nvSpPr>
+        <p:spPr/>
+        <p:txBody>
+          <a:bodyPr/>
+          <a:lstStyle/>
+          <a:p>
+            <a:endParaRPr lang="en-GB"/>
+          </a:p>
+        </p:txBody>
+      </p:sp>
+    </p:spTree>
+  </p:cSld>
+  <p:clrMapOvr>
+    <a:masterClrMapping/>
+  </p:clrMapOvr>
+</p:sld>
+</file>
+
+<file path=ppt/slides/slide6.xml><?xml version="1.0" encoding="utf-8"?>
+<p:sld xmlns:a="http://schemas.openxmlformats.org/drawingml/2006/main" xmlns:r="http://schemas.openxmlformats.org/officeDocument/2006/relationships" xmlns:p="http://schemas.openxmlformats.org/presentationml/2006/main">
+  <p:cSld>
+    <p:spTree>
+      <p:nvGrpSpPr>
+        <p:cNvPr id="1" name=""/>
+        <p:cNvGrpSpPr/>
+        <p:nvPr/>
+      </p:nvGrpSpPr>
+      <p:grpSpPr>
+        <a:xfrm>
+          <a:off x="0" y="0"/>
+          <a:ext cx="0" cy="0"/>
+          <a:chOff x="0" y="0"/>
+          <a:chExt cx="0" cy="0"/>
+        </a:xfrm>
+      </p:grpSpPr>
+      <p:sp>
+        <p:nvSpPr>
+          <p:cNvPr id="2" name="Title 1"/>
+          <p:cNvSpPr>
+            <a:spLocks noGrp="1"/>
+          </p:cNvSpPr>
+          <p:nvPr>
+            <p:ph type="title"/>
+          </p:nvPr>
+        </p:nvSpPr>
+        <p:spPr/>
+        <p:txBody>
+          <a:bodyPr/>
+          <a:lstStyle/>
+          <a:p>
+            <a:r>
+              <a:rPr lang="en-GB" dirty="0"/>
+              <a:t>Idea 1- </a:t>
+            </a:r>
+            <a:r>
+              <a:rPr lang="en-GB" dirty="0" smtClean="0"/>
+              <a:t>Challenges</a:t>
+            </a:r>
+            <a:endParaRPr lang="en-GB" dirty="0"/>
+          </a:p>
+        </p:txBody>
+      </p:sp>
+      <p:sp>
+        <p:nvSpPr>
+          <p:cNvPr id="3" name="Content Placeholder 2"/>
+          <p:cNvSpPr>
+            <a:spLocks noGrp="1"/>
+          </p:cNvSpPr>
+          <p:nvPr>
+            <p:ph idx="1"/>
+          </p:nvPr>
+        </p:nvSpPr>
+        <p:spPr/>
+        <p:txBody>
+          <a:bodyPr/>
+          <a:lstStyle/>
+          <a:p>
+            <a:endParaRPr lang="en-GB"/>
+          </a:p>
+        </p:txBody>
+      </p:sp>
+    </p:spTree>
+    <p:extLst>
+      <p:ext uri="{BB962C8B-B14F-4D97-AF65-F5344CB8AC3E}">
+        <p14:creationId xmlns:p14="http://schemas.microsoft.com/office/powerpoint/2010/main" xmlns="" val="650876939"/>
+      </p:ext>
+    </p:extLst>
+  </p:cSld>
+  <p:clrMapOvr>
+    <a:masterClrMapping/>
+  </p:clrMapOvr>
+</p:sld>
+</file>
+
+<file path=ppt/slides/slide7.xml><?xml version="1.0" encoding="utf-8"?>
+<p:sld xmlns:a="http://schemas.openxmlformats.org/drawingml/2006/main" xmlns:r="http://schemas.openxmlformats.org/officeDocument/2006/relationships" xmlns:p="http://schemas.openxmlformats.org/presentationml/2006/main">
+  <p:cSld>
+    <p:spTree>
+      <p:nvGrpSpPr>
+        <p:cNvPr id="1" name=""/>
+        <p:cNvGrpSpPr/>
+        <p:nvPr/>
+      </p:nvGrpSpPr>
+      <p:grpSpPr>
+        <a:xfrm>
+          <a:off x="0" y="0"/>
+          <a:ext cx="0" cy="0"/>
+          <a:chOff x="0" y="0"/>
+          <a:chExt cx="0" cy="0"/>
+        </a:xfrm>
+      </p:grpSpPr>
+      <p:sp>
+        <p:nvSpPr>
+          <p:cNvPr id="2" name="Title 1"/>
+          <p:cNvSpPr>
+            <a:spLocks noGrp="1"/>
+          </p:cNvSpPr>
+          <p:nvPr>
+            <p:ph type="title"/>
+          </p:nvPr>
+        </p:nvSpPr>
+        <p:spPr/>
+        <p:txBody>
+          <a:bodyPr/>
+          <a:lstStyle/>
+          <a:p>
+            <a:r>
+              <a:rPr lang="en-GB" dirty="0"/>
+              <a:t>Idea </a:t>
+            </a:r>
+            <a:r>
+              <a:rPr lang="en-GB" dirty="0" smtClean="0"/>
+              <a:t>2- </a:t>
+            </a:r>
+            <a:r>
+              <a:rPr lang="en-GB" dirty="0" smtClean="0"/>
+              <a:t>Game?</a:t>
+            </a:r>
+            <a:endParaRPr lang="en-GB" dirty="0"/>
+          </a:p>
+        </p:txBody>
+      </p:sp>
+      <p:sp>
+        <p:nvSpPr>
+          <p:cNvPr id="3" name="Content Placeholder 2"/>
+          <p:cNvSpPr>
+            <a:spLocks noGrp="1"/>
+          </p:cNvSpPr>
+          <p:nvPr>
+            <p:ph idx="1"/>
+          </p:nvPr>
+        </p:nvSpPr>
+        <p:spPr/>
+        <p:txBody>
+          <a:bodyPr/>
+          <a:lstStyle/>
+          <a:p>
+            <a:endParaRPr lang="en-GB"/>
+          </a:p>
+        </p:txBody>
+      </p:sp>
+    </p:spTree>
+    <p:extLst>
+      <p:ext uri="{BB962C8B-B14F-4D97-AF65-F5344CB8AC3E}">
+        <p14:creationId xmlns:p14="http://schemas.microsoft.com/office/powerpoint/2010/main" xmlns="" val="650876939"/>
+      </p:ext>
+    </p:extLst>
+  </p:cSld>
+  <p:clrMapOvr>
+    <a:masterClrMapping/>
+  </p:clrMapOvr>
+</p:sld>
+</file>
+
+<file path=ppt/slides/slide8.xml><?xml version="1.0" encoding="utf-8"?>
+<p:sld xmlns:a="http://schemas.openxmlformats.org/drawingml/2006/main" xmlns:r="http://schemas.openxmlformats.org/officeDocument/2006/relationships" xmlns:p="http://schemas.openxmlformats.org/presentationml/2006/main">
+  <p:cSld>
+    <p:spTree>
+      <p:nvGrpSpPr>
+        <p:cNvPr id="1" name=""/>
+        <p:cNvGrpSpPr/>
+        <p:nvPr/>
+      </p:nvGrpSpPr>
+      <p:grpSpPr>
+        <a:xfrm>
+          <a:off x="0" y="0"/>
+          <a:ext cx="0" cy="0"/>
+          <a:chOff x="0" y="0"/>
+          <a:chExt cx="0" cy="0"/>
+        </a:xfrm>
+      </p:grpSpPr>
+      <p:sp>
+        <p:nvSpPr>
+          <p:cNvPr id="2" name="Title 1"/>
+          <p:cNvSpPr>
+            <a:spLocks noGrp="1"/>
+          </p:cNvSpPr>
+          <p:nvPr>
+            <p:ph type="title"/>
+          </p:nvPr>
+        </p:nvSpPr>
+        <p:spPr/>
+        <p:txBody>
+          <a:bodyPr/>
+          <a:lstStyle/>
+          <a:p>
+            <a:r>
+              <a:rPr lang="en-GB" dirty="0" smtClean="0"/>
+              <a:t>Idea 2 - Demographic</a:t>
+            </a:r>
+            <a:endParaRPr lang="en-GB" dirty="0"/>
+          </a:p>
+        </p:txBody>
+      </p:sp>
+      <p:sp>
+        <p:nvSpPr>
+          <p:cNvPr id="3" name="Content Placeholder 2"/>
+          <p:cNvSpPr>
+            <a:spLocks noGrp="1"/>
+          </p:cNvSpPr>
+          <p:nvPr>
+            <p:ph idx="1"/>
+          </p:nvPr>
+        </p:nvSpPr>
+        <p:spPr/>
+        <p:txBody>
+          <a:bodyPr>
+            <a:normAutofit fontScale="55000" lnSpcReduction="20000"/>
+          </a:bodyPr>
+          <a:lstStyle/>
+          <a:p>
+            <a:r>
+              <a:rPr lang="en-GB" sz="3800" dirty="0" smtClean="0"/>
+              <a:t>Age: 25-34</a:t>
+            </a:r>
+          </a:p>
+          <a:p>
+            <a:r>
+              <a:rPr lang="en-GB" sz="3800" dirty="0" smtClean="0"/>
+              <a:t>Gender: Female</a:t>
+            </a:r>
+          </a:p>
+          <a:p>
+            <a:r>
+              <a:rPr lang="en-GB" sz="3800" dirty="0" smtClean="0"/>
+              <a:t>Hard Fun: </a:t>
+            </a:r>
+          </a:p>
+          <a:p>
+            <a:pPr lvl="1"/>
+            <a:r>
+              <a:rPr lang="en-GB" sz="3800" dirty="0" smtClean="0"/>
+              <a:t>Accomplishment</a:t>
+            </a:r>
+          </a:p>
+          <a:p>
+            <a:pPr lvl="1"/>
+            <a:r>
+              <a:rPr lang="en-GB" sz="3800" dirty="0" smtClean="0"/>
+              <a:t>Strategy</a:t>
+            </a:r>
+          </a:p>
+          <a:p>
+            <a:pPr lvl="1"/>
+            <a:r>
+              <a:rPr lang="en-GB" sz="3800" dirty="0" smtClean="0"/>
+              <a:t>Clear Goal</a:t>
+            </a:r>
+          </a:p>
+          <a:p>
+            <a:pPr lvl="1"/>
+            <a:endParaRPr lang="en-GB" dirty="0" smtClean="0"/>
+          </a:p>
+          <a:p>
+            <a:endParaRPr lang="en-GB" dirty="0" smtClean="0"/>
+          </a:p>
+          <a:p>
+            <a:pPr>
+              <a:buNone/>
+            </a:pPr>
+            <a:endParaRPr lang="en-GB" dirty="0"/>
+          </a:p>
+          <a:p>
+            <a:pPr>
+              <a:buNone/>
+            </a:pPr>
+            <a:endParaRPr lang="en-GB" dirty="0" smtClean="0"/>
+          </a:p>
+          <a:p>
+            <a:pPr>
+              <a:buNone/>
+            </a:pPr>
+            <a:endParaRPr lang="en-GB" dirty="0" smtClean="0"/>
+          </a:p>
+          <a:p>
+            <a:pPr>
+              <a:buNone/>
+            </a:pPr>
+            <a:endParaRPr lang="en-GB" dirty="0" smtClean="0"/>
+          </a:p>
+          <a:p>
+            <a:pPr>
+              <a:buNone/>
+            </a:pPr>
+            <a:endParaRPr lang="en-GB" dirty="0" smtClean="0"/>
+          </a:p>
+          <a:p>
+            <a:pPr>
+              <a:buNone/>
+            </a:pPr>
+            <a:endParaRPr lang="en-GB" dirty="0" smtClean="0"/>
+          </a:p>
+          <a:p>
+            <a:pPr>
+              <a:buNone/>
+            </a:pPr>
+            <a:endParaRPr lang="en-GB" sz="1100" dirty="0" smtClean="0"/>
+          </a:p>
+          <a:p>
+            <a:pPr>
+              <a:buNone/>
+            </a:pPr>
+            <a:endParaRPr lang="en-GB" sz="1100" dirty="0" smtClean="0"/>
+          </a:p>
+          <a:p>
+            <a:pPr>
+              <a:buNone/>
+            </a:pPr>
+            <a:r>
+              <a:rPr lang="en-GB" sz="1100" dirty="0" smtClean="0"/>
+              <a:t>Source: http://www.realitymine.com/myth-busting-mobile-gaming-demographics/</a:t>
+            </a:r>
+          </a:p>
+        </p:txBody>
+      </p:sp>
+      <p:pic>
+        <p:nvPicPr>
+          <p:cNvPr id="24578" name="Picture 2" descr="Mobile gaming: age of mobile gamers"/>
+          <p:cNvPicPr>
+            <a:picLocks noChangeAspect="1" noChangeArrowheads="1"/>
+          </p:cNvPicPr>
+          <p:nvPr/>
+        </p:nvPicPr>
+        <p:blipFill>
+          <a:blip r:embed="rId2" cstate="print"/>
+          <a:srcRect/>
+          <a:stretch>
+            <a:fillRect/>
+          </a:stretch>
+        </p:blipFill>
+        <p:spPr bwMode="auto">
+          <a:xfrm>
+            <a:off x="4499992" y="1934319"/>
+            <a:ext cx="3754047" cy="2286769"/>
+          </a:xfrm>
+          <a:prstGeom prst="rect">
+            <a:avLst/>
+          </a:prstGeom>
+          <a:noFill/>
+        </p:spPr>
+      </p:pic>
+    </p:spTree>
+  </p:cSld>
+  <p:clrMapOvr>
+    <a:masterClrMapping/>
+  </p:clrMapOvr>
+</p:sld>
+</file>
+
+<file path=ppt/slides/slide9.xml><?xml version="1.0" encoding="utf-8"?>
+<p:sld xmlns:a="http://schemas.openxmlformats.org/drawingml/2006/main" xmlns:r="http://schemas.openxmlformats.org/officeDocument/2006/relationships" xmlns:p="http://schemas.openxmlformats.org/presentationml/2006/main">
+  <p:cSld>
+    <p:spTree>
+      <p:nvGrpSpPr>
+        <p:cNvPr id="1" name=""/>
+        <p:cNvGrpSpPr/>
+        <p:nvPr/>
+      </p:nvGrpSpPr>
+      <p:grpSpPr>
+        <a:xfrm>
+          <a:off x="0" y="0"/>
+          <a:ext cx="0" cy="0"/>
+          <a:chOff x="0" y="0"/>
+          <a:chExt cx="0" cy="0"/>
+        </a:xfrm>
+      </p:grpSpPr>
+      <p:sp>
+        <p:nvSpPr>
+          <p:cNvPr id="2" name="Title 1"/>
+          <p:cNvSpPr>
+            <a:spLocks noGrp="1"/>
+          </p:cNvSpPr>
+          <p:nvPr>
+            <p:ph type="title"/>
+          </p:nvPr>
+        </p:nvSpPr>
+        <p:spPr/>
+        <p:txBody>
+          <a:bodyPr/>
+          <a:lstStyle/>
+          <a:p>
+            <a:r>
+              <a:rPr lang="en-GB" dirty="0" smtClean="0"/>
+              <a:t>Idea 2 – Platform and Genre</a:t>
+            </a:r>
+            <a:endParaRPr lang="en-GB" dirty="0"/>
+          </a:p>
+        </p:txBody>
+      </p:sp>
+      <p:sp>
+        <p:nvSpPr>
+          <p:cNvPr id="3" name="Content Placeholder 2"/>
+          <p:cNvSpPr>
+            <a:spLocks noGrp="1"/>
+          </p:cNvSpPr>
+          <p:nvPr>
+            <p:ph idx="1"/>
+          </p:nvPr>
+        </p:nvSpPr>
+        <p:spPr/>
+        <p:txBody>
+          <a:bodyPr>
+            <a:normAutofit/>
+          </a:bodyPr>
+          <a:lstStyle/>
+          <a:p>
+            <a:r>
+              <a:rPr lang="en-GB" dirty="0" smtClean="0"/>
+              <a:t>Platform: Mobile and Tablet</a:t>
+            </a:r>
+          </a:p>
+          <a:p>
+            <a:r>
+              <a:rPr lang="en-GB" dirty="0" smtClean="0"/>
+              <a:t>Genre: Puzzle</a:t>
+            </a:r>
+          </a:p>
+          <a:p>
+            <a:r>
+              <a:rPr lang="en-GB" dirty="0" smtClean="0"/>
+              <a:t>Duration: Up to 2 minutes</a:t>
+            </a:r>
+          </a:p>
+          <a:p>
+            <a:endParaRPr lang="en-GB" dirty="0" smtClean="0"/>
+          </a:p>
+          <a:p>
+            <a:endParaRPr lang="en-GB" dirty="0" smtClean="0"/>
+          </a:p>
+          <a:p>
+            <a:endParaRPr lang="en-GB" dirty="0" smtClean="0"/>
+          </a:p>
+          <a:p>
+            <a:endParaRPr lang="en-GB" dirty="0" smtClean="0"/>
+          </a:p>
+          <a:p>
+            <a:pPr>
+              <a:buNone/>
+            </a:pPr>
+            <a:endParaRPr lang="en-GB" sz="700" dirty="0" smtClean="0"/>
+          </a:p>
+          <a:p>
+            <a:pPr>
+              <a:buNone/>
+            </a:pPr>
+            <a:endParaRPr lang="en-GB" sz="700" dirty="0" smtClean="0"/>
+          </a:p>
+          <a:p>
+            <a:pPr>
+              <a:buNone/>
+            </a:pPr>
+            <a:endParaRPr lang="en-GB" sz="700" dirty="0" smtClean="0"/>
+          </a:p>
+          <a:p>
+            <a:pPr>
+              <a:buNone/>
+            </a:pPr>
+            <a:endParaRPr lang="en-GB" sz="700" dirty="0" smtClean="0"/>
+          </a:p>
+          <a:p>
+            <a:pPr>
+              <a:buNone/>
+            </a:pPr>
+            <a:r>
+              <a:rPr lang="en-GB" sz="700" dirty="0" smtClean="0"/>
+              <a:t>Source: http://www.realitymine.com/myth-busting-mobile-gaming-demographics/</a:t>
+            </a:r>
+          </a:p>
+        </p:txBody>
+      </p:sp>
+      <p:pic>
+        <p:nvPicPr>
+          <p:cNvPr id="23554" name="Picture 2" descr="Mobile gaming:Daily playing patterns"/>
+          <p:cNvPicPr>
+            <a:picLocks noChangeAspect="1" noChangeArrowheads="1"/>
+          </p:cNvPicPr>
+          <p:nvPr/>
+        </p:nvPicPr>
+        <p:blipFill>
+          <a:blip r:embed="rId2" cstate="print"/>
+          <a:srcRect/>
+          <a:stretch>
+            <a:fillRect/>
+          </a:stretch>
+        </p:blipFill>
+        <p:spPr bwMode="auto">
+          <a:xfrm>
+            <a:off x="1835696" y="3501008"/>
+            <a:ext cx="5760640" cy="2647532"/>
           </a:xfrm>
           <a:prstGeom prst="rect">
             <a:avLst/>

</xml_diff>